<commit_message>
Cleaned up documentation working files.
</commit_message>
<xml_diff>
--- a/docs/Figures/EnvironmentWorking.pptx
+++ b/docs/Figures/EnvironmentWorking.pptx
@@ -15,7 +15,7 @@
     <p:sldId id="331" r:id="rId6"/>
     <p:sldId id="349" r:id="rId7"/>
     <p:sldId id="335" r:id="rId8"/>
-    <p:sldId id="348" r:id="rId9"/>
+    <p:sldId id="355" r:id="rId9"/>
     <p:sldId id="336" r:id="rId10"/>
     <p:sldId id="337" r:id="rId11"/>
     <p:sldId id="338" r:id="rId12"/>
@@ -128,7 +128,7 @@
   </p:defaultTextStyle>
   <p:extLst>
     <p:ext uri="{EFAFB233-063F-42B5-8137-9DF3F51BA10A}">
-      <p15:sldGuideLst xmlns="" xmlns:p15="http://schemas.microsoft.com/office/powerpoint/2012/main">
+      <p15:sldGuideLst xmlns:p15="http://schemas.microsoft.com/office/powerpoint/2012/main">
         <p15:guide id="1" orient="horz" pos="2160">
           <p15:clr>
             <a:srgbClr val="A4A3A4"/>
@@ -145,8 +145,12 @@
 </p:presentation>
 </file>
 
+<file path=ppt/revisionInfo.xml><?xml version="1.0" encoding="utf-8"?>
+<p1510:revInfo xmlns:a="http://schemas.openxmlformats.org/drawingml/2006/main" xmlns:r="http://schemas.openxmlformats.org/officeDocument/2006/relationships" xmlns:p1510="http://schemas.microsoft.com/office/powerpoint/2015/10/main"/>
+</file>
+
 <file path=ppt/charts/chart1.xml><?xml version="1.0" encoding="utf-8"?>
-<c:chartSpace xmlns:c="http://schemas.openxmlformats.org/drawingml/2006/chart" xmlns:a="http://schemas.openxmlformats.org/drawingml/2006/main" xmlns:r="http://schemas.openxmlformats.org/officeDocument/2006/relationships">
+<c:chartSpace xmlns:c="http://schemas.openxmlformats.org/drawingml/2006/chart" xmlns:a="http://schemas.openxmlformats.org/drawingml/2006/main" xmlns:r="http://schemas.openxmlformats.org/officeDocument/2006/relationships" xmlns:c16r2="http://schemas.microsoft.com/office/drawing/2015/06/chart">
   <c:date1904 val="0"/>
   <c:lang val="en-US"/>
   <c:roundedCorners val="0"/>
@@ -337,6 +341,11 @@
             </c:numRef>
           </c:yVal>
           <c:smooth val="0"/>
+          <c:extLst>
+            <c:ext xmlns:c16="http://schemas.microsoft.com/office/drawing/2014/chart" uri="{C3380CC4-5D6E-409C-BE32-E72D297353CC}">
+              <c16:uniqueId val="{00000001-E1C5-42C5-88B3-6827DE6F144D}"/>
+            </c:ext>
+          </c:extLst>
         </c:ser>
         <c:dLbls>
           <c:showLegendKey val="0"/>
@@ -373,7 +382,6 @@
               </a:p>
             </c:rich>
           </c:tx>
-          <c:layout/>
           <c:overlay val="0"/>
         </c:title>
         <c:numFmt formatCode="General" sourceLinked="1"/>
@@ -408,7 +416,6 @@
               </a:p>
             </c:rich>
           </c:tx>
-          <c:layout/>
           <c:overlay val="0"/>
         </c:title>
         <c:numFmt formatCode="General" sourceLinked="1"/>
@@ -441,7 +448,7 @@
 </file>
 
 <file path=ppt/charts/chart2.xml><?xml version="1.0" encoding="utf-8"?>
-<c:chartSpace xmlns:c="http://schemas.openxmlformats.org/drawingml/2006/chart" xmlns:a="http://schemas.openxmlformats.org/drawingml/2006/main" xmlns:r="http://schemas.openxmlformats.org/officeDocument/2006/relationships">
+<c:chartSpace xmlns:c="http://schemas.openxmlformats.org/drawingml/2006/chart" xmlns:a="http://schemas.openxmlformats.org/drawingml/2006/main" xmlns:r="http://schemas.openxmlformats.org/officeDocument/2006/relationships" xmlns:c16r2="http://schemas.microsoft.com/office/drawing/2015/06/chart">
   <c:date1904 val="0"/>
   <c:lang val="en-US"/>
   <c:roundedCorners val="0"/>
@@ -632,6 +639,11 @@
             </c:numRef>
           </c:yVal>
           <c:smooth val="0"/>
+          <c:extLst>
+            <c:ext xmlns:c16="http://schemas.microsoft.com/office/drawing/2014/chart" uri="{C3380CC4-5D6E-409C-BE32-E72D297353CC}">
+              <c16:uniqueId val="{00000001-58F0-494C-8626-9CA32C63D5C6}"/>
+            </c:ext>
+          </c:extLst>
         </c:ser>
         <c:dLbls>
           <c:showLegendKey val="0"/>
@@ -668,7 +680,6 @@
               </a:p>
             </c:rich>
           </c:tx>
-          <c:layout/>
           <c:overlay val="0"/>
         </c:title>
         <c:numFmt formatCode="General" sourceLinked="1"/>
@@ -703,7 +714,6 @@
               </a:p>
             </c:rich>
           </c:tx>
-          <c:layout/>
           <c:overlay val="0"/>
         </c:title>
         <c:numFmt formatCode="General" sourceLinked="1"/>
@@ -736,7 +746,7 @@
 </file>
 
 <file path=ppt/charts/chart3.xml><?xml version="1.0" encoding="utf-8"?>
-<c:chartSpace xmlns:c="http://schemas.openxmlformats.org/drawingml/2006/chart" xmlns:a="http://schemas.openxmlformats.org/drawingml/2006/main" xmlns:r="http://schemas.openxmlformats.org/officeDocument/2006/relationships">
+<c:chartSpace xmlns:c="http://schemas.openxmlformats.org/drawingml/2006/chart" xmlns:a="http://schemas.openxmlformats.org/drawingml/2006/main" xmlns:r="http://schemas.openxmlformats.org/officeDocument/2006/relationships" xmlns:c16r2="http://schemas.microsoft.com/office/drawing/2015/06/chart">
   <c:date1904 val="0"/>
   <c:lang val="en-US"/>
   <c:roundedCorners val="0"/>
@@ -927,6 +937,11 @@
             </c:numRef>
           </c:yVal>
           <c:smooth val="0"/>
+          <c:extLst>
+            <c:ext xmlns:c16="http://schemas.microsoft.com/office/drawing/2014/chart" uri="{C3380CC4-5D6E-409C-BE32-E72D297353CC}">
+              <c16:uniqueId val="{00000001-858C-4195-8A6E-2FBC152E8518}"/>
+            </c:ext>
+          </c:extLst>
         </c:ser>
         <c:dLbls>
           <c:showLegendKey val="0"/>
@@ -963,7 +978,6 @@
               </a:p>
             </c:rich>
           </c:tx>
-          <c:layout/>
           <c:overlay val="0"/>
         </c:title>
         <c:numFmt formatCode="General" sourceLinked="1"/>
@@ -998,7 +1012,6 @@
               </a:p>
             </c:rich>
           </c:tx>
-          <c:layout/>
           <c:overlay val="0"/>
         </c:title>
         <c:numFmt formatCode="General" sourceLinked="1"/>
@@ -1031,7 +1044,7 @@
 </file>
 
 <file path=ppt/charts/chart4.xml><?xml version="1.0" encoding="utf-8"?>
-<c:chartSpace xmlns:c="http://schemas.openxmlformats.org/drawingml/2006/chart" xmlns:a="http://schemas.openxmlformats.org/drawingml/2006/main" xmlns:r="http://schemas.openxmlformats.org/officeDocument/2006/relationships">
+<c:chartSpace xmlns:c="http://schemas.openxmlformats.org/drawingml/2006/chart" xmlns:a="http://schemas.openxmlformats.org/drawingml/2006/main" xmlns:r="http://schemas.openxmlformats.org/officeDocument/2006/relationships" xmlns:c16r2="http://schemas.microsoft.com/office/drawing/2015/06/chart">
   <c:date1904 val="0"/>
   <c:lang val="en-US"/>
   <c:roundedCorners val="0"/>
@@ -1157,6 +1170,11 @@
             </c:numRef>
           </c:yVal>
           <c:smooth val="0"/>
+          <c:extLst>
+            <c:ext xmlns:c16="http://schemas.microsoft.com/office/drawing/2014/chart" uri="{C3380CC4-5D6E-409C-BE32-E72D297353CC}">
+              <c16:uniqueId val="{00000002-EDED-4B64-A376-C6C5D2699507}"/>
+            </c:ext>
+          </c:extLst>
         </c:ser>
         <c:ser>
           <c:idx val="1"/>
@@ -1235,6 +1253,11 @@
             </c:numRef>
           </c:yVal>
           <c:smooth val="0"/>
+          <c:extLst>
+            <c:ext xmlns:c16="http://schemas.microsoft.com/office/drawing/2014/chart" uri="{C3380CC4-5D6E-409C-BE32-E72D297353CC}">
+              <c16:uniqueId val="{00000005-EDED-4B64-A376-C6C5D2699507}"/>
+            </c:ext>
+          </c:extLst>
         </c:ser>
         <c:ser>
           <c:idx val="2"/>
@@ -1279,6 +1302,11 @@
             </c:numRef>
           </c:yVal>
           <c:smooth val="0"/>
+          <c:extLst>
+            <c:ext xmlns:c16="http://schemas.microsoft.com/office/drawing/2014/chart" uri="{C3380CC4-5D6E-409C-BE32-E72D297353CC}">
+              <c16:uniqueId val="{00000006-EDED-4B64-A376-C6C5D2699507}"/>
+            </c:ext>
+          </c:extLst>
         </c:ser>
         <c:dLbls>
           <c:showLegendKey val="0"/>
@@ -1317,7 +1345,6 @@
               </a:p>
             </c:rich>
           </c:tx>
-          <c:layout/>
           <c:overlay val="0"/>
         </c:title>
         <c:numFmt formatCode="General" sourceLinked="1"/>
@@ -1348,19 +1375,19 @@
                   <a:defRPr/>
                 </a:pPr>
                 <a:r>
-                  <a:rPr lang="en-US" dirty="0" smtClean="0"/>
+                  <a:rPr lang="en-US" dirty="0"/>
                   <a:t>Heat of Vaporization</a:t>
                 </a:r>
                 <a:r>
-                  <a:rPr lang="en-US" baseline="0" dirty="0" smtClean="0"/>
+                  <a:rPr lang="en-US" baseline="0" dirty="0"/>
                   <a:t> of Water </a:t>
                 </a:r>
                 <a:r>
-                  <a:rPr lang="en-US" dirty="0" smtClean="0"/>
+                  <a:rPr lang="en-US" dirty="0"/>
                   <a:t>(J/</a:t>
                 </a:r>
                 <a:r>
-                  <a:rPr lang="en-US" dirty="0" err="1" smtClean="0"/>
+                  <a:rPr lang="en-US" dirty="0" err="1"/>
                   <a:t>mol</a:t>
                 </a:r>
                 <a:r>
@@ -1370,7 +1397,6 @@
               </a:p>
             </c:rich>
           </c:tx>
-          <c:layout/>
           <c:overlay val="0"/>
         </c:title>
         <c:numFmt formatCode="General" sourceLinked="1"/>
@@ -1484,7 +1510,7 @@
           <a:p>
             <a:fld id="{7B126BB8-5932-4ACC-8CD5-328D9DA138C9}" type="datetimeFigureOut">
               <a:rPr lang="en-US" smtClean="0"/>
-              <a:t>3/6/2017</a:t>
+              <a:t>8/23/2017</a:t>
             </a:fld>
             <a:endParaRPr lang="en-US"/>
           </a:p>
@@ -1548,38 +1574,37 @@
           <a:p>
             <a:pPr lvl="0"/>
             <a:r>
-              <a:rPr lang="en-US" smtClean="0"/>
+              <a:rPr lang="en-US"/>
               <a:t>Click to edit Master text styles</a:t>
             </a:r>
           </a:p>
           <a:p>
             <a:pPr lvl="1"/>
             <a:r>
-              <a:rPr lang="en-US" smtClean="0"/>
+              <a:rPr lang="en-US"/>
               <a:t>Second level</a:t>
             </a:r>
           </a:p>
           <a:p>
             <a:pPr lvl="2"/>
             <a:r>
-              <a:rPr lang="en-US" smtClean="0"/>
+              <a:rPr lang="en-US"/>
               <a:t>Third level</a:t>
             </a:r>
           </a:p>
           <a:p>
             <a:pPr lvl="3"/>
             <a:r>
-              <a:rPr lang="en-US" smtClean="0"/>
+              <a:rPr lang="en-US"/>
               <a:t>Fourth level</a:t>
             </a:r>
           </a:p>
           <a:p>
             <a:pPr lvl="4"/>
             <a:r>
-              <a:rPr lang="en-US" smtClean="0"/>
+              <a:rPr lang="en-US"/>
               <a:t>Fifth level</a:t>
             </a:r>
-            <a:endParaRPr lang="en-US"/>
           </a:p>
         </p:txBody>
       </p:sp>
@@ -1790,10 +1815,9 @@
           <a:lstStyle/>
           <a:p>
             <a:r>
-              <a:rPr lang="en-US" smtClean="0"/>
+              <a:rPr lang="en-US"/>
               <a:t>Click to edit Master title style</a:t>
             </a:r>
-            <a:endParaRPr lang="en-US"/>
           </a:p>
         </p:txBody>
       </p:sp>
@@ -1909,10 +1933,9 @@
           </a:lstStyle>
           <a:p>
             <a:r>
-              <a:rPr lang="en-US" smtClean="0"/>
+              <a:rPr lang="en-US"/>
               <a:t>Click to edit Master subtitle style</a:t>
             </a:r>
-            <a:endParaRPr lang="en-US"/>
           </a:p>
         </p:txBody>
       </p:sp>
@@ -1933,7 +1956,7 @@
           <a:p>
             <a:fld id="{9E9AFD63-10BD-4598-9E1E-9FFECB76D2D7}" type="datetimeFigureOut">
               <a:rPr lang="en-US" smtClean="0"/>
-              <a:t>3/6/2017</a:t>
+              <a:t>8/23/2017</a:t>
             </a:fld>
             <a:endParaRPr lang="en-US"/>
           </a:p>
@@ -2027,10 +2050,9 @@
           <a:lstStyle/>
           <a:p>
             <a:r>
-              <a:rPr lang="en-US" smtClean="0"/>
+              <a:rPr lang="en-US"/>
               <a:t>Click to edit Master title style</a:t>
             </a:r>
-            <a:endParaRPr lang="en-US"/>
           </a:p>
         </p:txBody>
       </p:sp>
@@ -2051,38 +2073,37 @@
           <a:p>
             <a:pPr lvl="0"/>
             <a:r>
-              <a:rPr lang="en-US" smtClean="0"/>
+              <a:rPr lang="en-US"/>
               <a:t>Click to edit Master text styles</a:t>
             </a:r>
           </a:p>
           <a:p>
             <a:pPr lvl="1"/>
             <a:r>
-              <a:rPr lang="en-US" smtClean="0"/>
+              <a:rPr lang="en-US"/>
               <a:t>Second level</a:t>
             </a:r>
           </a:p>
           <a:p>
             <a:pPr lvl="2"/>
             <a:r>
-              <a:rPr lang="en-US" smtClean="0"/>
+              <a:rPr lang="en-US"/>
               <a:t>Third level</a:t>
             </a:r>
           </a:p>
           <a:p>
             <a:pPr lvl="3"/>
             <a:r>
-              <a:rPr lang="en-US" smtClean="0"/>
+              <a:rPr lang="en-US"/>
               <a:t>Fourth level</a:t>
             </a:r>
           </a:p>
           <a:p>
             <a:pPr lvl="4"/>
             <a:r>
-              <a:rPr lang="en-US" smtClean="0"/>
+              <a:rPr lang="en-US"/>
               <a:t>Fifth level</a:t>
             </a:r>
-            <a:endParaRPr lang="en-US"/>
           </a:p>
         </p:txBody>
       </p:sp>
@@ -2103,7 +2124,7 @@
           <a:p>
             <a:fld id="{9E9AFD63-10BD-4598-9E1E-9FFECB76D2D7}" type="datetimeFigureOut">
               <a:rPr lang="en-US" smtClean="0"/>
-              <a:t>3/6/2017</a:t>
+              <a:t>8/23/2017</a:t>
             </a:fld>
             <a:endParaRPr lang="en-US"/>
           </a:p>
@@ -2202,10 +2223,9 @@
           <a:lstStyle/>
           <a:p>
             <a:r>
-              <a:rPr lang="en-US" smtClean="0"/>
+              <a:rPr lang="en-US"/>
               <a:t>Click to edit Master title style</a:t>
             </a:r>
-            <a:endParaRPr lang="en-US"/>
           </a:p>
         </p:txBody>
       </p:sp>
@@ -2231,38 +2251,37 @@
           <a:p>
             <a:pPr lvl="0"/>
             <a:r>
-              <a:rPr lang="en-US" smtClean="0"/>
+              <a:rPr lang="en-US"/>
               <a:t>Click to edit Master text styles</a:t>
             </a:r>
           </a:p>
           <a:p>
             <a:pPr lvl="1"/>
             <a:r>
-              <a:rPr lang="en-US" smtClean="0"/>
+              <a:rPr lang="en-US"/>
               <a:t>Second level</a:t>
             </a:r>
           </a:p>
           <a:p>
             <a:pPr lvl="2"/>
             <a:r>
-              <a:rPr lang="en-US" smtClean="0"/>
+              <a:rPr lang="en-US"/>
               <a:t>Third level</a:t>
             </a:r>
           </a:p>
           <a:p>
             <a:pPr lvl="3"/>
             <a:r>
-              <a:rPr lang="en-US" smtClean="0"/>
+              <a:rPr lang="en-US"/>
               <a:t>Fourth level</a:t>
             </a:r>
           </a:p>
           <a:p>
             <a:pPr lvl="4"/>
             <a:r>
-              <a:rPr lang="en-US" smtClean="0"/>
+              <a:rPr lang="en-US"/>
               <a:t>Fifth level</a:t>
             </a:r>
-            <a:endParaRPr lang="en-US"/>
           </a:p>
         </p:txBody>
       </p:sp>
@@ -2283,7 +2302,7 @@
           <a:p>
             <a:fld id="{9E9AFD63-10BD-4598-9E1E-9FFECB76D2D7}" type="datetimeFigureOut">
               <a:rPr lang="en-US" smtClean="0"/>
-              <a:t>3/6/2017</a:t>
+              <a:t>8/23/2017</a:t>
             </a:fld>
             <a:endParaRPr lang="en-US"/>
           </a:p>
@@ -2478,10 +2497,9 @@
           </a:lstStyle>
           <a:p>
             <a:r>
-              <a:rPr lang="en-US" dirty="0" smtClean="0"/>
+              <a:rPr lang="en-US" dirty="0"/>
               <a:t>date</a:t>
             </a:r>
-            <a:endParaRPr lang="en-US" dirty="0"/>
           </a:p>
         </p:txBody>
       </p:sp>
@@ -2645,10 +2663,9 @@
           </a:lstStyle>
           <a:p>
             <a:r>
-              <a:rPr lang="en-US" dirty="0" smtClean="0"/>
+              <a:rPr lang="en-US" dirty="0"/>
               <a:t>Click to edit title</a:t>
             </a:r>
-            <a:endParaRPr lang="en-US" dirty="0"/>
           </a:p>
         </p:txBody>
       </p:sp>
@@ -2737,38 +2754,37 @@
           <a:p>
             <a:pPr lvl="0"/>
             <a:r>
-              <a:rPr lang="en-US" smtClean="0"/>
+              <a:rPr lang="en-US"/>
               <a:t>Click to edit Master text styles</a:t>
             </a:r>
           </a:p>
           <a:p>
             <a:pPr lvl="1"/>
             <a:r>
-              <a:rPr lang="en-US" smtClean="0"/>
+              <a:rPr lang="en-US"/>
               <a:t>Second level</a:t>
             </a:r>
           </a:p>
           <a:p>
             <a:pPr lvl="2"/>
             <a:r>
-              <a:rPr lang="en-US" smtClean="0"/>
+              <a:rPr lang="en-US"/>
               <a:t>Third level</a:t>
             </a:r>
           </a:p>
           <a:p>
             <a:pPr lvl="3"/>
             <a:r>
-              <a:rPr lang="en-US" smtClean="0"/>
+              <a:rPr lang="en-US"/>
               <a:t>Fourth level</a:t>
             </a:r>
           </a:p>
           <a:p>
             <a:pPr lvl="4"/>
             <a:r>
-              <a:rPr lang="en-US" smtClean="0"/>
+              <a:rPr lang="en-US"/>
               <a:t>Fifth level</a:t>
             </a:r>
-            <a:endParaRPr lang="en-US"/>
           </a:p>
         </p:txBody>
       </p:sp>
@@ -2798,7 +2814,7 @@
           <a:lstStyle/>
           <a:p>
             <a:r>
-              <a:rPr lang="en-US" smtClean="0"/>
+              <a:rPr lang="en-US"/>
               <a:t>Click to edit Master title style</a:t>
             </a:r>
             <a:endParaRPr lang="en-US" dirty="0"/>
@@ -2863,7 +2879,7 @@
           </a:lstStyle>
           <a:p>
             <a:r>
-              <a:rPr lang="en-US" smtClean="0"/>
+              <a:rPr lang="en-US"/>
               <a:t>Click to edit Master title style</a:t>
             </a:r>
             <a:endParaRPr lang="en-US" dirty="0"/>
@@ -2986,7 +3002,7 @@
           <a:p>
             <a:pPr lvl="0"/>
             <a:r>
-              <a:rPr lang="en-US" smtClean="0"/>
+              <a:rPr lang="en-US"/>
               <a:t>Click to edit Master text styles</a:t>
             </a:r>
           </a:p>
@@ -3075,35 +3091,35 @@
           <a:p>
             <a:pPr lvl="0"/>
             <a:r>
-              <a:rPr lang="en-US" smtClean="0"/>
+              <a:rPr lang="en-US"/>
               <a:t>Click to edit Master text styles</a:t>
             </a:r>
           </a:p>
           <a:p>
             <a:pPr lvl="1"/>
             <a:r>
-              <a:rPr lang="en-US" smtClean="0"/>
+              <a:rPr lang="en-US"/>
               <a:t>Second level</a:t>
             </a:r>
           </a:p>
           <a:p>
             <a:pPr lvl="2"/>
             <a:r>
-              <a:rPr lang="en-US" smtClean="0"/>
+              <a:rPr lang="en-US"/>
               <a:t>Third level</a:t>
             </a:r>
           </a:p>
           <a:p>
             <a:pPr lvl="3"/>
             <a:r>
-              <a:rPr lang="en-US" smtClean="0"/>
+              <a:rPr lang="en-US"/>
               <a:t>Fourth level</a:t>
             </a:r>
           </a:p>
           <a:p>
             <a:pPr lvl="4"/>
             <a:r>
-              <a:rPr lang="en-US" smtClean="0"/>
+              <a:rPr lang="en-US"/>
               <a:t>Fifth level</a:t>
             </a:r>
             <a:endParaRPr lang="en-US" dirty="0"/>
@@ -3163,38 +3179,37 @@
           <a:p>
             <a:pPr lvl="0"/>
             <a:r>
-              <a:rPr lang="en-US" smtClean="0"/>
+              <a:rPr lang="en-US"/>
               <a:t>Click to edit Master text styles</a:t>
             </a:r>
           </a:p>
           <a:p>
             <a:pPr lvl="1"/>
             <a:r>
-              <a:rPr lang="en-US" smtClean="0"/>
+              <a:rPr lang="en-US"/>
               <a:t>Second level</a:t>
             </a:r>
           </a:p>
           <a:p>
             <a:pPr lvl="2"/>
             <a:r>
-              <a:rPr lang="en-US" smtClean="0"/>
+              <a:rPr lang="en-US"/>
               <a:t>Third level</a:t>
             </a:r>
           </a:p>
           <a:p>
             <a:pPr lvl="3"/>
             <a:r>
-              <a:rPr lang="en-US" smtClean="0"/>
+              <a:rPr lang="en-US"/>
               <a:t>Fourth level</a:t>
             </a:r>
           </a:p>
           <a:p>
             <a:pPr lvl="4"/>
             <a:r>
-              <a:rPr lang="en-US" smtClean="0"/>
+              <a:rPr lang="en-US"/>
               <a:t>Fifth level</a:t>
             </a:r>
-            <a:endParaRPr lang="en-US"/>
           </a:p>
         </p:txBody>
       </p:sp>
@@ -3224,7 +3239,7 @@
           <a:lstStyle/>
           <a:p>
             <a:r>
-              <a:rPr lang="en-US" smtClean="0"/>
+              <a:rPr lang="en-US"/>
               <a:t>Click to edit Master title style</a:t>
             </a:r>
             <a:endParaRPr lang="en-US" dirty="0"/>
@@ -3325,7 +3340,7 @@
           <a:p>
             <a:pPr lvl="0"/>
             <a:r>
-              <a:rPr lang="en-US" smtClean="0"/>
+              <a:rPr lang="en-US"/>
               <a:t>Click to edit Master text styles</a:t>
             </a:r>
           </a:p>
@@ -3384,35 +3399,35 @@
           <a:p>
             <a:pPr lvl="0"/>
             <a:r>
-              <a:rPr lang="en-US" smtClean="0"/>
+              <a:rPr lang="en-US"/>
               <a:t>Click to edit Master text styles</a:t>
             </a:r>
           </a:p>
           <a:p>
             <a:pPr lvl="1"/>
             <a:r>
-              <a:rPr lang="en-US" smtClean="0"/>
+              <a:rPr lang="en-US"/>
               <a:t>Second level</a:t>
             </a:r>
           </a:p>
           <a:p>
             <a:pPr lvl="2"/>
             <a:r>
-              <a:rPr lang="en-US" smtClean="0"/>
+              <a:rPr lang="en-US"/>
               <a:t>Third level</a:t>
             </a:r>
           </a:p>
           <a:p>
             <a:pPr lvl="3"/>
             <a:r>
-              <a:rPr lang="en-US" smtClean="0"/>
+              <a:rPr lang="en-US"/>
               <a:t>Fourth level</a:t>
             </a:r>
           </a:p>
           <a:p>
             <a:pPr lvl="4"/>
             <a:r>
-              <a:rPr lang="en-US" smtClean="0"/>
+              <a:rPr lang="en-US"/>
               <a:t>Fifth level</a:t>
             </a:r>
             <a:endParaRPr lang="en-US" dirty="0"/>
@@ -3483,7 +3498,7 @@
           <a:p>
             <a:pPr lvl="0"/>
             <a:r>
-              <a:rPr lang="en-US" smtClean="0"/>
+              <a:rPr lang="en-US"/>
               <a:t>Click to edit Master text styles</a:t>
             </a:r>
           </a:p>
@@ -3542,38 +3557,37 @@
           <a:p>
             <a:pPr lvl="0"/>
             <a:r>
-              <a:rPr lang="en-US" smtClean="0"/>
+              <a:rPr lang="en-US"/>
               <a:t>Click to edit Master text styles</a:t>
             </a:r>
           </a:p>
           <a:p>
             <a:pPr lvl="1"/>
             <a:r>
-              <a:rPr lang="en-US" smtClean="0"/>
+              <a:rPr lang="en-US"/>
               <a:t>Second level</a:t>
             </a:r>
           </a:p>
           <a:p>
             <a:pPr lvl="2"/>
             <a:r>
-              <a:rPr lang="en-US" smtClean="0"/>
+              <a:rPr lang="en-US"/>
               <a:t>Third level</a:t>
             </a:r>
           </a:p>
           <a:p>
             <a:pPr lvl="3"/>
             <a:r>
-              <a:rPr lang="en-US" smtClean="0"/>
+              <a:rPr lang="en-US"/>
               <a:t>Fourth level</a:t>
             </a:r>
           </a:p>
           <a:p>
             <a:pPr lvl="4"/>
             <a:r>
-              <a:rPr lang="en-US" smtClean="0"/>
+              <a:rPr lang="en-US"/>
               <a:t>Fifth level</a:t>
             </a:r>
-            <a:endParaRPr lang="en-US"/>
           </a:p>
         </p:txBody>
       </p:sp>
@@ -3603,7 +3617,7 @@
           <a:lstStyle/>
           <a:p>
             <a:r>
-              <a:rPr lang="en-US" smtClean="0"/>
+              <a:rPr lang="en-US"/>
               <a:t>Click to edit Master title style</a:t>
             </a:r>
             <a:endParaRPr lang="en-US" dirty="0"/>
@@ -3666,7 +3680,7 @@
           <a:lstStyle/>
           <a:p>
             <a:r>
-              <a:rPr lang="en-US" smtClean="0"/>
+              <a:rPr lang="en-US"/>
               <a:t>Click to edit Master title style</a:t>
             </a:r>
             <a:endParaRPr lang="en-US" dirty="0"/>
@@ -3761,10 +3775,9 @@
           </a:lstStyle>
           <a:p>
             <a:r>
-              <a:rPr lang="en-US" smtClean="0"/>
+              <a:rPr lang="en-US"/>
               <a:t>Click to edit Master title style</a:t>
             </a:r>
-            <a:endParaRPr lang="en-US"/>
           </a:p>
         </p:txBody>
       </p:sp>
@@ -3821,35 +3834,35 @@
           <a:p>
             <a:pPr lvl="0"/>
             <a:r>
-              <a:rPr lang="en-US" smtClean="0"/>
+              <a:rPr lang="en-US"/>
               <a:t>Click to edit Master text styles</a:t>
             </a:r>
           </a:p>
           <a:p>
             <a:pPr lvl="1"/>
             <a:r>
-              <a:rPr lang="en-US" smtClean="0"/>
+              <a:rPr lang="en-US"/>
               <a:t>Second level</a:t>
             </a:r>
           </a:p>
           <a:p>
             <a:pPr lvl="2"/>
             <a:r>
-              <a:rPr lang="en-US" smtClean="0"/>
+              <a:rPr lang="en-US"/>
               <a:t>Third level</a:t>
             </a:r>
           </a:p>
           <a:p>
             <a:pPr lvl="3"/>
             <a:r>
-              <a:rPr lang="en-US" smtClean="0"/>
+              <a:rPr lang="en-US"/>
               <a:t>Fourth level</a:t>
             </a:r>
           </a:p>
           <a:p>
             <a:pPr lvl="4"/>
             <a:r>
-              <a:rPr lang="en-US" smtClean="0"/>
+              <a:rPr lang="en-US"/>
               <a:t>Fifth level</a:t>
             </a:r>
             <a:endParaRPr lang="en-US" dirty="0"/>
@@ -3918,7 +3931,7 @@
           <a:p>
             <a:pPr lvl="0"/>
             <a:r>
-              <a:rPr lang="en-US" smtClean="0"/>
+              <a:rPr lang="en-US"/>
               <a:t>Click to edit Master text styles</a:t>
             </a:r>
           </a:p>
@@ -3970,10 +3983,9 @@
           <a:lstStyle/>
           <a:p>
             <a:r>
-              <a:rPr lang="en-US" smtClean="0"/>
+              <a:rPr lang="en-US"/>
               <a:t>Click to edit Master title style</a:t>
             </a:r>
-            <a:endParaRPr lang="en-US"/>
           </a:p>
         </p:txBody>
       </p:sp>
@@ -3994,38 +4006,37 @@
           <a:p>
             <a:pPr lvl="0"/>
             <a:r>
-              <a:rPr lang="en-US" smtClean="0"/>
+              <a:rPr lang="en-US"/>
               <a:t>Click to edit Master text styles</a:t>
             </a:r>
           </a:p>
           <a:p>
             <a:pPr lvl="1"/>
             <a:r>
-              <a:rPr lang="en-US" smtClean="0"/>
+              <a:rPr lang="en-US"/>
               <a:t>Second level</a:t>
             </a:r>
           </a:p>
           <a:p>
             <a:pPr lvl="2"/>
             <a:r>
-              <a:rPr lang="en-US" smtClean="0"/>
+              <a:rPr lang="en-US"/>
               <a:t>Third level</a:t>
             </a:r>
           </a:p>
           <a:p>
             <a:pPr lvl="3"/>
             <a:r>
-              <a:rPr lang="en-US" smtClean="0"/>
+              <a:rPr lang="en-US"/>
               <a:t>Fourth level</a:t>
             </a:r>
           </a:p>
           <a:p>
             <a:pPr lvl="4"/>
             <a:r>
-              <a:rPr lang="en-US" smtClean="0"/>
+              <a:rPr lang="en-US"/>
               <a:t>Fifth level</a:t>
             </a:r>
-            <a:endParaRPr lang="en-US"/>
           </a:p>
         </p:txBody>
       </p:sp>
@@ -4046,7 +4057,7 @@
           <a:p>
             <a:fld id="{9E9AFD63-10BD-4598-9E1E-9FFECB76D2D7}" type="datetimeFigureOut">
               <a:rPr lang="en-US" smtClean="0"/>
-              <a:t>3/6/2017</a:t>
+              <a:t>8/23/2017</a:t>
             </a:fld>
             <a:endParaRPr lang="en-US"/>
           </a:p>
@@ -4152,10 +4163,9 @@
           </a:lstStyle>
           <a:p>
             <a:r>
-              <a:rPr lang="en-US" smtClean="0"/>
+              <a:rPr lang="en-US"/>
               <a:t>Click to edit Master title style</a:t>
             </a:r>
-            <a:endParaRPr lang="en-US"/>
           </a:p>
         </p:txBody>
       </p:sp>
@@ -4220,10 +4230,9 @@
           </a:lstStyle>
           <a:p>
             <a:r>
-              <a:rPr lang="en-US" smtClean="0"/>
+              <a:rPr lang="en-US"/>
               <a:t>Drag picture to placeholder or click icon to add</a:t>
             </a:r>
-            <a:endParaRPr lang="en-US"/>
           </a:p>
         </p:txBody>
       </p:sp>
@@ -4289,7 +4298,7 @@
           <a:p>
             <a:pPr lvl="0"/>
             <a:r>
-              <a:rPr lang="en-US" smtClean="0"/>
+              <a:rPr lang="en-US"/>
               <a:t>Click to edit Master text styles</a:t>
             </a:r>
           </a:p>
@@ -4350,10 +4359,9 @@
           </a:lstStyle>
           <a:p>
             <a:r>
-              <a:rPr lang="en-US" smtClean="0"/>
+              <a:rPr lang="en-US"/>
               <a:t>Click to edit Master title style</a:t>
             </a:r>
-            <a:endParaRPr lang="en-US"/>
           </a:p>
         </p:txBody>
       </p:sp>
@@ -4470,7 +4478,7 @@
           <a:p>
             <a:pPr lvl="0"/>
             <a:r>
-              <a:rPr lang="en-US" smtClean="0"/>
+              <a:rPr lang="en-US"/>
               <a:t>Click to edit Master text styles</a:t>
             </a:r>
           </a:p>
@@ -4493,7 +4501,7 @@
           <a:p>
             <a:fld id="{9E9AFD63-10BD-4598-9E1E-9FFECB76D2D7}" type="datetimeFigureOut">
               <a:rPr lang="en-US" smtClean="0"/>
-              <a:t>3/6/2017</a:t>
+              <a:t>8/23/2017</a:t>
             </a:fld>
             <a:endParaRPr lang="en-US"/>
           </a:p>
@@ -4587,10 +4595,9 @@
           <a:lstStyle/>
           <a:p>
             <a:r>
-              <a:rPr lang="en-US" smtClean="0"/>
+              <a:rPr lang="en-US"/>
               <a:t>Click to edit Master title style</a:t>
             </a:r>
-            <a:endParaRPr lang="en-US"/>
           </a:p>
         </p:txBody>
       </p:sp>
@@ -4644,38 +4651,37 @@
           <a:p>
             <a:pPr lvl="0"/>
             <a:r>
-              <a:rPr lang="en-US" smtClean="0"/>
+              <a:rPr lang="en-US"/>
               <a:t>Click to edit Master text styles</a:t>
             </a:r>
           </a:p>
           <a:p>
             <a:pPr lvl="1"/>
             <a:r>
-              <a:rPr lang="en-US" smtClean="0"/>
+              <a:rPr lang="en-US"/>
               <a:t>Second level</a:t>
             </a:r>
           </a:p>
           <a:p>
             <a:pPr lvl="2"/>
             <a:r>
-              <a:rPr lang="en-US" smtClean="0"/>
+              <a:rPr lang="en-US"/>
               <a:t>Third level</a:t>
             </a:r>
           </a:p>
           <a:p>
             <a:pPr lvl="3"/>
             <a:r>
-              <a:rPr lang="en-US" smtClean="0"/>
+              <a:rPr lang="en-US"/>
               <a:t>Fourth level</a:t>
             </a:r>
           </a:p>
           <a:p>
             <a:pPr lvl="4"/>
             <a:r>
-              <a:rPr lang="en-US" smtClean="0"/>
+              <a:rPr lang="en-US"/>
               <a:t>Fifth level</a:t>
             </a:r>
-            <a:endParaRPr lang="en-US"/>
           </a:p>
         </p:txBody>
       </p:sp>
@@ -4729,38 +4735,37 @@
           <a:p>
             <a:pPr lvl="0"/>
             <a:r>
-              <a:rPr lang="en-US" smtClean="0"/>
+              <a:rPr lang="en-US"/>
               <a:t>Click to edit Master text styles</a:t>
             </a:r>
           </a:p>
           <a:p>
             <a:pPr lvl="1"/>
             <a:r>
-              <a:rPr lang="en-US" smtClean="0"/>
+              <a:rPr lang="en-US"/>
               <a:t>Second level</a:t>
             </a:r>
           </a:p>
           <a:p>
             <a:pPr lvl="2"/>
             <a:r>
-              <a:rPr lang="en-US" smtClean="0"/>
+              <a:rPr lang="en-US"/>
               <a:t>Third level</a:t>
             </a:r>
           </a:p>
           <a:p>
             <a:pPr lvl="3"/>
             <a:r>
-              <a:rPr lang="en-US" smtClean="0"/>
+              <a:rPr lang="en-US"/>
               <a:t>Fourth level</a:t>
             </a:r>
           </a:p>
           <a:p>
             <a:pPr lvl="4"/>
             <a:r>
-              <a:rPr lang="en-US" smtClean="0"/>
+              <a:rPr lang="en-US"/>
               <a:t>Fifth level</a:t>
             </a:r>
-            <a:endParaRPr lang="en-US"/>
           </a:p>
         </p:txBody>
       </p:sp>
@@ -4781,7 +4786,7 @@
           <a:p>
             <a:fld id="{9E9AFD63-10BD-4598-9E1E-9FFECB76D2D7}" type="datetimeFigureOut">
               <a:rPr lang="en-US" smtClean="0"/>
-              <a:t>3/6/2017</a:t>
+              <a:t>8/23/2017</a:t>
             </a:fld>
             <a:endParaRPr lang="en-US"/>
           </a:p>
@@ -4879,10 +4884,9 @@
           </a:lstStyle>
           <a:p>
             <a:r>
-              <a:rPr lang="en-US" smtClean="0"/>
+              <a:rPr lang="en-US"/>
               <a:t>Click to edit Master title style</a:t>
             </a:r>
-            <a:endParaRPr lang="en-US"/>
           </a:p>
         </p:txBody>
       </p:sp>
@@ -4945,7 +4949,7 @@
           <a:p>
             <a:pPr lvl="0"/>
             <a:r>
-              <a:rPr lang="en-US" smtClean="0"/>
+              <a:rPr lang="en-US"/>
               <a:t>Click to edit Master text styles</a:t>
             </a:r>
           </a:p>
@@ -5001,38 +5005,37 @@
           <a:p>
             <a:pPr lvl="0"/>
             <a:r>
-              <a:rPr lang="en-US" smtClean="0"/>
+              <a:rPr lang="en-US"/>
               <a:t>Click to edit Master text styles</a:t>
             </a:r>
           </a:p>
           <a:p>
             <a:pPr lvl="1"/>
             <a:r>
-              <a:rPr lang="en-US" smtClean="0"/>
+              <a:rPr lang="en-US"/>
               <a:t>Second level</a:t>
             </a:r>
           </a:p>
           <a:p>
             <a:pPr lvl="2"/>
             <a:r>
-              <a:rPr lang="en-US" smtClean="0"/>
+              <a:rPr lang="en-US"/>
               <a:t>Third level</a:t>
             </a:r>
           </a:p>
           <a:p>
             <a:pPr lvl="3"/>
             <a:r>
-              <a:rPr lang="en-US" smtClean="0"/>
+              <a:rPr lang="en-US"/>
               <a:t>Fourth level</a:t>
             </a:r>
           </a:p>
           <a:p>
             <a:pPr lvl="4"/>
             <a:r>
-              <a:rPr lang="en-US" smtClean="0"/>
+              <a:rPr lang="en-US"/>
               <a:t>Fifth level</a:t>
             </a:r>
-            <a:endParaRPr lang="en-US"/>
           </a:p>
         </p:txBody>
       </p:sp>
@@ -5095,7 +5098,7 @@
           <a:p>
             <a:pPr lvl="0"/>
             <a:r>
-              <a:rPr lang="en-US" smtClean="0"/>
+              <a:rPr lang="en-US"/>
               <a:t>Click to edit Master text styles</a:t>
             </a:r>
           </a:p>
@@ -5151,38 +5154,37 @@
           <a:p>
             <a:pPr lvl="0"/>
             <a:r>
-              <a:rPr lang="en-US" smtClean="0"/>
+              <a:rPr lang="en-US"/>
               <a:t>Click to edit Master text styles</a:t>
             </a:r>
           </a:p>
           <a:p>
             <a:pPr lvl="1"/>
             <a:r>
-              <a:rPr lang="en-US" smtClean="0"/>
+              <a:rPr lang="en-US"/>
               <a:t>Second level</a:t>
             </a:r>
           </a:p>
           <a:p>
             <a:pPr lvl="2"/>
             <a:r>
-              <a:rPr lang="en-US" smtClean="0"/>
+              <a:rPr lang="en-US"/>
               <a:t>Third level</a:t>
             </a:r>
           </a:p>
           <a:p>
             <a:pPr lvl="3"/>
             <a:r>
-              <a:rPr lang="en-US" smtClean="0"/>
+              <a:rPr lang="en-US"/>
               <a:t>Fourth level</a:t>
             </a:r>
           </a:p>
           <a:p>
             <a:pPr lvl="4"/>
             <a:r>
-              <a:rPr lang="en-US" smtClean="0"/>
+              <a:rPr lang="en-US"/>
               <a:t>Fifth level</a:t>
             </a:r>
-            <a:endParaRPr lang="en-US"/>
           </a:p>
         </p:txBody>
       </p:sp>
@@ -5203,7 +5205,7 @@
           <a:p>
             <a:fld id="{9E9AFD63-10BD-4598-9E1E-9FFECB76D2D7}" type="datetimeFigureOut">
               <a:rPr lang="en-US" smtClean="0"/>
-              <a:t>3/6/2017</a:t>
+              <a:t>8/23/2017</a:t>
             </a:fld>
             <a:endParaRPr lang="en-US"/>
           </a:p>
@@ -5297,10 +5299,9 @@
           <a:lstStyle/>
           <a:p>
             <a:r>
-              <a:rPr lang="en-US" smtClean="0"/>
+              <a:rPr lang="en-US"/>
               <a:t>Click to edit Master title style</a:t>
             </a:r>
-            <a:endParaRPr lang="en-US"/>
           </a:p>
         </p:txBody>
       </p:sp>
@@ -5321,7 +5322,7 @@
           <a:p>
             <a:fld id="{9E9AFD63-10BD-4598-9E1E-9FFECB76D2D7}" type="datetimeFigureOut">
               <a:rPr lang="en-US" smtClean="0"/>
-              <a:t>3/6/2017</a:t>
+              <a:t>8/23/2017</a:t>
             </a:fld>
             <a:endParaRPr lang="en-US"/>
           </a:p>
@@ -5416,7 +5417,7 @@
           <a:p>
             <a:fld id="{9E9AFD63-10BD-4598-9E1E-9FFECB76D2D7}" type="datetimeFigureOut">
               <a:rPr lang="en-US" smtClean="0"/>
-              <a:t>3/6/2017</a:t>
+              <a:t>8/23/2017</a:t>
             </a:fld>
             <a:endParaRPr lang="en-US"/>
           </a:p>
@@ -5519,10 +5520,9 @@
           </a:lstStyle>
           <a:p>
             <a:r>
-              <a:rPr lang="en-US" smtClean="0"/>
+              <a:rPr lang="en-US"/>
               <a:t>Click to edit Master title style</a:t>
             </a:r>
-            <a:endParaRPr lang="en-US"/>
           </a:p>
         </p:txBody>
       </p:sp>
@@ -5576,38 +5576,37 @@
           <a:p>
             <a:pPr lvl="0"/>
             <a:r>
-              <a:rPr lang="en-US" smtClean="0"/>
+              <a:rPr lang="en-US"/>
               <a:t>Click to edit Master text styles</a:t>
             </a:r>
           </a:p>
           <a:p>
             <a:pPr lvl="1"/>
             <a:r>
-              <a:rPr lang="en-US" smtClean="0"/>
+              <a:rPr lang="en-US"/>
               <a:t>Second level</a:t>
             </a:r>
           </a:p>
           <a:p>
             <a:pPr lvl="2"/>
             <a:r>
-              <a:rPr lang="en-US" smtClean="0"/>
+              <a:rPr lang="en-US"/>
               <a:t>Third level</a:t>
             </a:r>
           </a:p>
           <a:p>
             <a:pPr lvl="3"/>
             <a:r>
-              <a:rPr lang="en-US" smtClean="0"/>
+              <a:rPr lang="en-US"/>
               <a:t>Fourth level</a:t>
             </a:r>
           </a:p>
           <a:p>
             <a:pPr lvl="4"/>
             <a:r>
-              <a:rPr lang="en-US" smtClean="0"/>
+              <a:rPr lang="en-US"/>
               <a:t>Fifth level</a:t>
             </a:r>
-            <a:endParaRPr lang="en-US"/>
           </a:p>
         </p:txBody>
       </p:sp>
@@ -5670,7 +5669,7 @@
           <a:p>
             <a:pPr lvl="0"/>
             <a:r>
-              <a:rPr lang="en-US" smtClean="0"/>
+              <a:rPr lang="en-US"/>
               <a:t>Click to edit Master text styles</a:t>
             </a:r>
           </a:p>
@@ -5693,7 +5692,7 @@
           <a:p>
             <a:fld id="{9E9AFD63-10BD-4598-9E1E-9FFECB76D2D7}" type="datetimeFigureOut">
               <a:rPr lang="en-US" smtClean="0"/>
-              <a:t>3/6/2017</a:t>
+              <a:t>8/23/2017</a:t>
             </a:fld>
             <a:endParaRPr lang="en-US"/>
           </a:p>
@@ -5796,10 +5795,9 @@
           </a:lstStyle>
           <a:p>
             <a:r>
-              <a:rPr lang="en-US" smtClean="0"/>
+              <a:rPr lang="en-US"/>
               <a:t>Click to edit Master title style</a:t>
             </a:r>
-            <a:endParaRPr lang="en-US"/>
           </a:p>
         </p:txBody>
       </p:sp>
@@ -5923,7 +5921,7 @@
           <a:p>
             <a:pPr lvl="0"/>
             <a:r>
-              <a:rPr lang="en-US" smtClean="0"/>
+              <a:rPr lang="en-US"/>
               <a:t>Click to edit Master text styles</a:t>
             </a:r>
           </a:p>
@@ -5946,7 +5944,7 @@
           <a:p>
             <a:fld id="{9E9AFD63-10BD-4598-9E1E-9FFECB76D2D7}" type="datetimeFigureOut">
               <a:rPr lang="en-US" smtClean="0"/>
-              <a:t>3/6/2017</a:t>
+              <a:t>8/23/2017</a:t>
             </a:fld>
             <a:endParaRPr lang="en-US"/>
           </a:p>
@@ -6055,10 +6053,9 @@
           <a:lstStyle/>
           <a:p>
             <a:r>
-              <a:rPr lang="en-US" smtClean="0"/>
+              <a:rPr lang="en-US"/>
               <a:t>Click to edit Master title style</a:t>
             </a:r>
-            <a:endParaRPr lang="en-US"/>
           </a:p>
         </p:txBody>
       </p:sp>
@@ -6089,38 +6086,37 @@
           <a:p>
             <a:pPr lvl="0"/>
             <a:r>
-              <a:rPr lang="en-US" smtClean="0"/>
+              <a:rPr lang="en-US"/>
               <a:t>Click to edit Master text styles</a:t>
             </a:r>
           </a:p>
           <a:p>
             <a:pPr lvl="1"/>
             <a:r>
-              <a:rPr lang="en-US" smtClean="0"/>
+              <a:rPr lang="en-US"/>
               <a:t>Second level</a:t>
             </a:r>
           </a:p>
           <a:p>
             <a:pPr lvl="2"/>
             <a:r>
-              <a:rPr lang="en-US" smtClean="0"/>
+              <a:rPr lang="en-US"/>
               <a:t>Third level</a:t>
             </a:r>
           </a:p>
           <a:p>
             <a:pPr lvl="3"/>
             <a:r>
-              <a:rPr lang="en-US" smtClean="0"/>
+              <a:rPr lang="en-US"/>
               <a:t>Fourth level</a:t>
             </a:r>
           </a:p>
           <a:p>
             <a:pPr lvl="4"/>
             <a:r>
-              <a:rPr lang="en-US" smtClean="0"/>
+              <a:rPr lang="en-US"/>
               <a:t>Fifth level</a:t>
             </a:r>
-            <a:endParaRPr lang="en-US"/>
           </a:p>
         </p:txBody>
       </p:sp>
@@ -6159,7 +6155,7 @@
           <a:p>
             <a:fld id="{9E9AFD63-10BD-4598-9E1E-9FFECB76D2D7}" type="datetimeFigureOut">
               <a:rPr lang="en-US" smtClean="0"/>
-              <a:t>3/6/2017</a:t>
+              <a:t>8/23/2017</a:t>
             </a:fld>
             <a:endParaRPr lang="en-US"/>
           </a:p>
@@ -6655,10 +6651,10 @@
                 <a:ea typeface="ＭＳ Ｐゴシック" pitchFamily="-106" charset="-128"/>
                 <a:cs typeface="ＭＳ Ｐゴシック" pitchFamily="-106" charset="-128"/>
               </a:rPr>
-              <a:t>Copyright </a:t>
-            </a:r>
-            <a:r>
-              <a:rPr lang="en-US" sz="600" dirty="0" smtClean="0">
+              <a:t>Copyright 2014. All rights reserved. Applied </a:t>
+            </a:r>
+            <a:r>
+              <a:rPr lang="en-US" sz="600" dirty="0" err="1">
                 <a:solidFill>
                   <a:prstClr val="black">
                     <a:lumMod val="65000"/>
@@ -6670,7 +6666,7 @@
                 <a:ea typeface="ＭＳ Ｐゴシック" pitchFamily="-106" charset="-128"/>
                 <a:cs typeface="ＭＳ Ｐゴシック" pitchFamily="-106" charset="-128"/>
               </a:rPr>
-              <a:t>2014. </a:t>
+              <a:t>ReArch</a:t>
             </a:r>
             <a:r>
               <a:rPr lang="en-US" sz="600" dirty="0">
@@ -6685,52 +6681,7 @@
                 <a:ea typeface="ＭＳ Ｐゴシック" pitchFamily="-106" charset="-128"/>
                 <a:cs typeface="ＭＳ Ｐゴシック" pitchFamily="-106" charset="-128"/>
               </a:rPr>
-              <a:t>All rights reserved. Applied </a:t>
-            </a:r>
-            <a:r>
-              <a:rPr lang="en-US" sz="600" dirty="0" err="1" smtClean="0">
-                <a:solidFill>
-                  <a:prstClr val="black">
-                    <a:lumMod val="65000"/>
-                    <a:lumOff val="35000"/>
-                    <a:alpha val="30000"/>
-                  </a:prstClr>
-                </a:solidFill>
-                <a:latin typeface="Arial" pitchFamily="-108" charset="0"/>
-                <a:ea typeface="ＭＳ Ｐゴシック" pitchFamily="-106" charset="-128"/>
-                <a:cs typeface="ＭＳ Ｐゴシック" pitchFamily="-106" charset="-128"/>
-              </a:rPr>
-              <a:t>ReArch</a:t>
-            </a:r>
-            <a:r>
-              <a:rPr lang="en-US" sz="600" dirty="0" smtClean="0">
-                <a:solidFill>
-                  <a:prstClr val="black">
-                    <a:lumMod val="65000"/>
-                    <a:lumOff val="35000"/>
-                    <a:alpha val="30000"/>
-                  </a:prstClr>
-                </a:solidFill>
-                <a:latin typeface="Arial" pitchFamily="-108" charset="0"/>
-                <a:ea typeface="ＭＳ Ｐゴシック" pitchFamily="-106" charset="-128"/>
-                <a:cs typeface="ＭＳ Ｐゴシック" pitchFamily="-106" charset="-128"/>
-              </a:rPr>
-              <a:t> </a:t>
-            </a:r>
-            <a:r>
-              <a:rPr lang="en-US" sz="600" dirty="0">
-                <a:solidFill>
-                  <a:prstClr val="black">
-                    <a:lumMod val="65000"/>
-                    <a:lumOff val="35000"/>
-                    <a:alpha val="30000"/>
-                  </a:prstClr>
-                </a:solidFill>
-                <a:latin typeface="Arial" pitchFamily="-108" charset="0"/>
-                <a:ea typeface="ＭＳ Ｐゴシック" pitchFamily="-106" charset="-128"/>
-                <a:cs typeface="ＭＳ Ｐゴシック" pitchFamily="-106" charset="-128"/>
-              </a:rPr>
-              <a:t>Associates, Inc.</a:t>
+              <a:t> Associates, Inc.</a:t>
             </a:r>
           </a:p>
         </p:txBody>
@@ -6813,35 +6764,35 @@
           <a:p>
             <a:pPr lvl="0"/>
             <a:r>
-              <a:rPr lang="en-US" smtClean="0"/>
+              <a:rPr lang="en-US"/>
               <a:t>Click to edit Master text styles</a:t>
             </a:r>
           </a:p>
           <a:p>
             <a:pPr lvl="1"/>
             <a:r>
-              <a:rPr lang="en-US" smtClean="0"/>
+              <a:rPr lang="en-US"/>
               <a:t>Second level</a:t>
             </a:r>
           </a:p>
           <a:p>
             <a:pPr lvl="2"/>
             <a:r>
-              <a:rPr lang="en-US" smtClean="0"/>
+              <a:rPr lang="en-US"/>
               <a:t>Third level</a:t>
             </a:r>
           </a:p>
           <a:p>
             <a:pPr lvl="3"/>
             <a:r>
-              <a:rPr lang="en-US" smtClean="0"/>
+              <a:rPr lang="en-US"/>
               <a:t>Fourth level</a:t>
             </a:r>
           </a:p>
           <a:p>
             <a:pPr lvl="4"/>
             <a:r>
-              <a:rPr lang="en-US" smtClean="0"/>
+              <a:rPr lang="en-US"/>
               <a:t>Fifth level</a:t>
             </a:r>
             <a:endParaRPr lang="en-US" dirty="0"/>
@@ -6874,7 +6825,7 @@
           <a:lstStyle/>
           <a:p>
             <a:r>
-              <a:rPr lang="en-US" smtClean="0"/>
+              <a:rPr lang="en-US"/>
               <a:t>Click to edit Master title style</a:t>
             </a:r>
             <a:endParaRPr lang="en-US" dirty="0"/>
@@ -7551,7 +7502,7 @@
                         <m:sSupPr>
                           <m:ctrlPr>
                             <a:rPr lang="en-US" i="1">
-                              <a:latin typeface="Cambria Math"/>
+                              <a:latin typeface="Cambria Math" panose="02040503050406030204" pitchFamily="18" charset="0"/>
                             </a:rPr>
                           </m:ctrlPr>
                         </m:sSupPr>
@@ -7568,7 +7519,7 @@
                             <m:dPr>
                               <m:ctrlPr>
                                 <a:rPr lang="en-US" i="1">
-                                  <a:latin typeface="Cambria Math"/>
+                                  <a:latin typeface="Cambria Math" panose="02040503050406030204" pitchFamily="18" charset="0"/>
                                 </a:rPr>
                               </m:ctrlPr>
                             </m:dPr>
@@ -7589,7 +7540,7 @@
                                 <m:fPr>
                                   <m:ctrlPr>
                                     <a:rPr lang="en-US" i="1">
-                                      <a:latin typeface="Cambria Math"/>
+                                      <a:latin typeface="Cambria Math" panose="02040503050406030204" pitchFamily="18" charset="0"/>
                                     </a:rPr>
                                   </m:ctrlPr>
                                 </m:fPr>
@@ -7702,11 +7653,41 @@
                 <a:tableStyleId>{5940675A-B579-460E-94D1-54222C63F5DA}</a:tableStyleId>
               </a:tblPr>
               <a:tblGrid>
-                <a:gridCol w="602744"/>
-                <a:gridCol w="602744"/>
-                <a:gridCol w="602744"/>
-                <a:gridCol w="568566"/>
-                <a:gridCol w="604910"/>
+                <a:gridCol w="602744">
+                  <a:extLst>
+                    <a:ext uri="{9D8B030D-6E8A-4147-A177-3AD203B41FA5}">
+                      <a16:colId xmlns:a16="http://schemas.microsoft.com/office/drawing/2014/main" val="20000"/>
+                    </a:ext>
+                  </a:extLst>
+                </a:gridCol>
+                <a:gridCol w="602744">
+                  <a:extLst>
+                    <a:ext uri="{9D8B030D-6E8A-4147-A177-3AD203B41FA5}">
+                      <a16:colId xmlns:a16="http://schemas.microsoft.com/office/drawing/2014/main" val="20001"/>
+                    </a:ext>
+                  </a:extLst>
+                </a:gridCol>
+                <a:gridCol w="602744">
+                  <a:extLst>
+                    <a:ext uri="{9D8B030D-6E8A-4147-A177-3AD203B41FA5}">
+                      <a16:colId xmlns:a16="http://schemas.microsoft.com/office/drawing/2014/main" val="20002"/>
+                    </a:ext>
+                  </a:extLst>
+                </a:gridCol>
+                <a:gridCol w="568566">
+                  <a:extLst>
+                    <a:ext uri="{9D8B030D-6E8A-4147-A177-3AD203B41FA5}">
+                      <a16:colId xmlns:a16="http://schemas.microsoft.com/office/drawing/2014/main" val="20003"/>
+                    </a:ext>
+                  </a:extLst>
+                </a:gridCol>
+                <a:gridCol w="604910">
+                  <a:extLst>
+                    <a:ext uri="{9D8B030D-6E8A-4147-A177-3AD203B41FA5}">
+                      <a16:colId xmlns:a16="http://schemas.microsoft.com/office/drawing/2014/main" val="20004"/>
+                    </a:ext>
+                  </a:extLst>
+                </a:gridCol>
               </a:tblGrid>
               <a:tr h="249746">
                 <a:tc>
@@ -7716,10 +7697,9 @@
                     <a:p>
                       <a:pPr algn="ctr"/>
                       <a:r>
-                        <a:rPr lang="en-US" sz="1200" b="1" dirty="0" smtClean="0"/>
+                        <a:rPr lang="en-US" sz="1200" b="1" dirty="0"/>
                         <a:t>A</a:t>
                       </a:r>
-                      <a:endParaRPr lang="en-US" sz="1200" b="1" dirty="0"/>
                     </a:p>
                   </a:txBody>
                   <a:tcPr marL="38100" marR="38100" marT="38100" marB="38100" anchor="ctr"/>
@@ -7759,26 +7739,23 @@
                     <a:p>
                       <a:pPr algn="ctr"/>
                       <a:r>
-                        <a:rPr lang="en-US" sz="1200" b="1" dirty="0" err="1" smtClean="0"/>
+                        <a:rPr lang="en-US" sz="1200" b="1" dirty="0" err="1"/>
                         <a:t>t</a:t>
                       </a:r>
                       <a:r>
-                        <a:rPr lang="en-US" sz="1200" b="1" baseline="-25000" dirty="0" err="1" smtClean="0"/>
+                        <a:rPr lang="en-US" sz="1200" b="1" baseline="-25000" dirty="0" err="1"/>
                         <a:t>min</a:t>
                       </a:r>
                       <a:r>
-                        <a:rPr lang="en-US" sz="1200" b="1" baseline="0" dirty="0" smtClean="0"/>
+                        <a:rPr lang="en-US" sz="1200" b="1" baseline="0" dirty="0"/>
                         <a:t> (</a:t>
                       </a:r>
                       <a:r>
-                        <a:rPr lang="en-US" sz="1200" b="1" dirty="0" smtClean="0">
+                        <a:rPr lang="en-US" sz="1200" b="1" dirty="0">
                           <a:effectLst/>
                         </a:rPr>
                         <a:t>°C)</a:t>
                       </a:r>
-                      <a:endParaRPr lang="en-US" sz="1200" b="1" dirty="0">
-                        <a:effectLst/>
-                      </a:endParaRPr>
                     </a:p>
                   </a:txBody>
                   <a:tcPr marL="38100" marR="38100" marT="38100" marB="38100" anchor="ctr"/>
@@ -7790,30 +7767,32 @@
                     <a:p>
                       <a:pPr algn="ctr"/>
                       <a:r>
-                        <a:rPr lang="en-US" sz="1200" b="1" dirty="0" err="1" smtClean="0"/>
+                        <a:rPr lang="en-US" sz="1200" b="1" dirty="0" err="1"/>
                         <a:t>t</a:t>
                       </a:r>
                       <a:r>
-                        <a:rPr lang="en-US" sz="1200" b="1" baseline="-25000" dirty="0" err="1" smtClean="0"/>
+                        <a:rPr lang="en-US" sz="1200" b="1" baseline="-25000" dirty="0" err="1"/>
                         <a:t>max</a:t>
                       </a:r>
                       <a:r>
-                        <a:rPr lang="en-US" sz="1200" b="1" dirty="0" smtClean="0"/>
+                        <a:rPr lang="en-US" sz="1200" b="1" dirty="0"/>
                         <a:t> (</a:t>
                       </a:r>
                       <a:r>
-                        <a:rPr lang="en-US" sz="1200" b="1" dirty="0" smtClean="0">
+                        <a:rPr lang="en-US" sz="1200" b="1" dirty="0">
                           <a:effectLst/>
                         </a:rPr>
                         <a:t>°C)</a:t>
                       </a:r>
-                      <a:endParaRPr lang="en-US" sz="1200" b="1" dirty="0">
-                        <a:effectLst/>
-                      </a:endParaRPr>
                     </a:p>
                   </a:txBody>
                   <a:tcPr marL="38100" marR="38100" marT="38100" marB="38100" anchor="ctr"/>
                 </a:tc>
+                <a:extLst>
+                  <a:ext uri="{0D108BD9-81ED-4DB2-BD59-A6C34878D82A}">
+                    <a16:rowId xmlns:a16="http://schemas.microsoft.com/office/drawing/2014/main" val="10000"/>
+                  </a:ext>
+                </a:extLst>
               </a:tr>
               <a:tr h="276863">
                 <a:tc>
@@ -7886,6 +7865,11 @@
                   </a:txBody>
                   <a:tcPr marL="38100" marR="38100" marT="38100" marB="38100" anchor="ctr"/>
                 </a:tc>
+                <a:extLst>
+                  <a:ext uri="{0D108BD9-81ED-4DB2-BD59-A6C34878D82A}">
+                    <a16:rowId xmlns:a16="http://schemas.microsoft.com/office/drawing/2014/main" val="10001"/>
+                  </a:ext>
+                </a:extLst>
               </a:tr>
               <a:tr h="276863">
                 <a:tc>
@@ -7958,6 +7942,11 @@
                   </a:txBody>
                   <a:tcPr marL="38100" marR="38100" marT="38100" marB="38100" anchor="ctr"/>
                 </a:tc>
+                <a:extLst>
+                  <a:ext uri="{0D108BD9-81ED-4DB2-BD59-A6C34878D82A}">
+                    <a16:rowId xmlns:a16="http://schemas.microsoft.com/office/drawing/2014/main" val="10002"/>
+                  </a:ext>
+                </a:extLst>
               </a:tr>
             </a:tbl>
           </a:graphicData>
@@ -7986,13 +7975,8 @@
           <a:p>
             <a:r>
               <a:rPr lang="en-US" u="sng" dirty="0"/>
-              <a:t>Antoine </a:t>
-            </a:r>
-            <a:r>
-              <a:rPr lang="en-US" u="sng" dirty="0" smtClean="0"/>
-              <a:t>Equation (for water):</a:t>
-            </a:r>
-            <a:endParaRPr lang="en-US" u="sng" dirty="0"/>
+              <a:t>Antoine Equation (for water):</a:t>
+            </a:r>
           </a:p>
         </p:txBody>
       </p:sp>
@@ -8032,26 +8016,25 @@
           <a:lstStyle/>
           <a:p>
             <a:r>
-              <a:rPr lang="en-US" sz="1200" i="1" dirty="0" smtClean="0"/>
+              <a:rPr lang="en-US" sz="1200" i="1" dirty="0"/>
               <a:t>For </a:t>
             </a:r>
             <a:r>
-              <a:rPr lang="en-US" sz="1200" i="1" dirty="0" err="1" smtClean="0"/>
+              <a:rPr lang="en-US" sz="1200" i="1" dirty="0" err="1"/>
               <a:t>p</a:t>
             </a:r>
             <a:r>
-              <a:rPr lang="en-US" sz="1200" i="1" baseline="-25000" dirty="0" err="1" smtClean="0"/>
+              <a:rPr lang="en-US" sz="1200" i="1" baseline="-25000" dirty="0" err="1"/>
               <a:t>sk,s</a:t>
             </a:r>
             <a:r>
-              <a:rPr lang="en-US" sz="1200" i="1" dirty="0" smtClean="0"/>
+              <a:rPr lang="en-US" sz="1200" i="1" dirty="0"/>
               <a:t> and p</a:t>
             </a:r>
             <a:r>
-              <a:rPr lang="en-US" sz="1200" i="1" baseline="-25000" dirty="0" smtClean="0"/>
+              <a:rPr lang="en-US" sz="1200" i="1" baseline="-25000" dirty="0"/>
               <a:t>a</a:t>
             </a:r>
-            <a:endParaRPr lang="en-US" sz="1200" i="1" baseline="-25000" dirty="0"/>
           </a:p>
         </p:txBody>
       </p:sp>
@@ -8185,7 +8168,7 @@
                         <m:fPr>
                           <m:ctrlPr>
                             <a:rPr lang="en-US" i="1">
-                              <a:latin typeface="Cambria Math"/>
+                              <a:latin typeface="Cambria Math" panose="02040503050406030204" pitchFamily="18" charset="0"/>
                             </a:rPr>
                           </m:ctrlPr>
                         </m:fPr>
@@ -8208,7 +8191,7 @@
                             <m:sSubPr>
                               <m:ctrlPr>
                                 <a:rPr lang="en-US" i="1">
-                                  <a:latin typeface="Cambria Math"/>
+                                  <a:latin typeface="Cambria Math" panose="02040503050406030204" pitchFamily="18" charset="0"/>
                                 </a:rPr>
                               </m:ctrlPr>
                             </m:sSubPr>
@@ -8412,7 +8395,7 @@
                         <m:fPr>
                           <m:ctrlPr>
                             <a:rPr lang="en-US" i="1">
-                              <a:latin typeface="Cambria Math"/>
+                              <a:latin typeface="Cambria Math" panose="02040503050406030204" pitchFamily="18" charset="0"/>
                             </a:rPr>
                           </m:ctrlPr>
                         </m:fPr>
@@ -8421,7 +8404,7 @@
                             <m:sSubPr>
                               <m:ctrlPr>
                                 <a:rPr lang="en-US" i="1">
-                                  <a:latin typeface="Cambria Math"/>
+                                  <a:latin typeface="Cambria Math" panose="02040503050406030204" pitchFamily="18" charset="0"/>
                                 </a:rPr>
                               </m:ctrlPr>
                             </m:sSubPr>
@@ -8446,7 +8429,7 @@
                             <m:sSubPr>
                               <m:ctrlPr>
                                 <a:rPr lang="en-US" i="1">
-                                  <a:latin typeface="Cambria Math"/>
+                                  <a:latin typeface="Cambria Math" panose="02040503050406030204" pitchFamily="18" charset="0"/>
                                 </a:rPr>
                               </m:ctrlPr>
                             </m:sSubPr>
@@ -8477,7 +8460,7 @@
                             <m:sSubPr>
                               <m:ctrlPr>
                                 <a:rPr lang="en-US" i="1">
-                                  <a:latin typeface="Cambria Math"/>
+                                  <a:latin typeface="Cambria Math" panose="02040503050406030204" pitchFamily="18" charset="0"/>
                                 </a:rPr>
                               </m:ctrlPr>
                             </m:sSubPr>
@@ -8502,7 +8485,7 @@
                             <m:sSubPr>
                               <m:ctrlPr>
                                 <a:rPr lang="en-US" i="1">
-                                  <a:latin typeface="Cambria Math"/>
+                                  <a:latin typeface="Cambria Math" panose="02040503050406030204" pitchFamily="18" charset="0"/>
                                 </a:rPr>
                               </m:ctrlPr>
                             </m:sSubPr>
@@ -8535,7 +8518,7 @@
                             <m:sSubPr>
                               <m:ctrlPr>
                                 <a:rPr lang="en-US" i="1">
-                                  <a:latin typeface="Cambria Math"/>
+                                  <a:latin typeface="Cambria Math" panose="02040503050406030204" pitchFamily="18" charset="0"/>
                                 </a:rPr>
                               </m:ctrlPr>
                             </m:sSubPr>
@@ -8727,7 +8710,7 @@
                         <m:sSubPr>
                           <m:ctrlPr>
                             <a:rPr lang="en-US" i="1">
-                              <a:latin typeface="Cambria Math"/>
+                              <a:latin typeface="Cambria Math" panose="02040503050406030204" pitchFamily="18" charset="0"/>
                             </a:rPr>
                           </m:ctrlPr>
                         </m:sSubPr>
@@ -8767,7 +8750,7 @@
                         <m:sSubPr>
                           <m:ctrlPr>
                             <a:rPr lang="en-US" i="1">
-                              <a:latin typeface="Cambria Math"/>
+                              <a:latin typeface="Cambria Math" panose="02040503050406030204" pitchFamily="18" charset="0"/>
                             </a:rPr>
                           </m:ctrlPr>
                         </m:sSubPr>
@@ -8957,7 +8940,7 @@
                         <m:sSubPr>
                           <m:ctrlPr>
                             <a:rPr lang="en-US" i="1">
-                              <a:latin typeface="Cambria Math"/>
+                              <a:latin typeface="Cambria Math" panose="02040503050406030204" pitchFamily="18" charset="0"/>
                             </a:rPr>
                           </m:ctrlPr>
                         </m:sSubPr>
@@ -8988,7 +8971,7 @@
                         <m:sSubPr>
                           <m:ctrlPr>
                             <a:rPr lang="en-US" i="1">
-                              <a:latin typeface="Cambria Math"/>
+                              <a:latin typeface="Cambria Math" panose="02040503050406030204" pitchFamily="18" charset="0"/>
                             </a:rPr>
                           </m:ctrlPr>
                         </m:sSubPr>
@@ -9019,7 +9002,7 @@
                         <m:sSubPr>
                           <m:ctrlPr>
                             <a:rPr lang="en-US" i="1">
-                              <a:latin typeface="Cambria Math"/>
+                              <a:latin typeface="Cambria Math" panose="02040503050406030204" pitchFamily="18" charset="0"/>
                             </a:rPr>
                           </m:ctrlPr>
                         </m:sSubPr>
@@ -9202,13 +9185,8 @@
           <a:p>
             <a:r>
               <a:rPr lang="en-US" sz="600" i="1" dirty="0"/>
-              <a:t>ASHRAE Handbook of </a:t>
-            </a:r>
-            <a:r>
-              <a:rPr lang="en-US" sz="600" i="1" dirty="0" smtClean="0"/>
-              <a:t>Fundamentals</a:t>
-            </a:r>
-            <a:endParaRPr lang="en-US" sz="600" i="1" dirty="0"/>
+              <a:t>ASHRAE Handbook of Fundamentals</a:t>
+            </a:r>
           </a:p>
         </p:txBody>
       </p:sp>
@@ -9290,7 +9268,7 @@
                             <a:solidFill>
                               <a:schemeClr val="dk1"/>
                             </a:solidFill>
-                            <a:latin typeface="Cambria Math"/>
+                            <a:latin typeface="Cambria Math" panose="02040503050406030204" pitchFamily="18" charset="0"/>
                           </a:rPr>
                         </m:ctrlPr>
                       </m:sSubPr>
@@ -9363,7 +9341,7 @@
                             <a:solidFill>
                               <a:schemeClr val="dk1"/>
                             </a:solidFill>
-                            <a:latin typeface="Cambria Math"/>
+                            <a:latin typeface="Cambria Math" panose="02040503050406030204" pitchFamily="18" charset="0"/>
                           </a:rPr>
                         </m:ctrlPr>
                       </m:sSubSupPr>
@@ -9423,7 +9401,7 @@
                             <a:solidFill>
                               <a:schemeClr val="dk1"/>
                             </a:solidFill>
-                            <a:latin typeface="Cambria Math"/>
+                            <a:latin typeface="Cambria Math" panose="02040503050406030204" pitchFamily="18" charset="0"/>
                           </a:rPr>
                         </m:ctrlPr>
                       </m:sSubSupPr>
@@ -9483,7 +9461,7 @@
                             <a:solidFill>
                               <a:schemeClr val="dk1"/>
                             </a:solidFill>
-                            <a:latin typeface="Cambria Math"/>
+                            <a:latin typeface="Cambria Math" panose="02040503050406030204" pitchFamily="18" charset="0"/>
                           </a:rPr>
                         </m:ctrlPr>
                       </m:sSubPr>
@@ -9640,7 +9618,7 @@
                             <a:solidFill>
                               <a:schemeClr val="dk1"/>
                             </a:solidFill>
-                            <a:latin typeface="Cambria Math"/>
+                            <a:latin typeface="Cambria Math" panose="02040503050406030204" pitchFamily="18" charset="0"/>
                           </a:rPr>
                         </m:ctrlPr>
                       </m:sSubSupPr>
@@ -9697,7 +9675,7 @@
                             <a:solidFill>
                               <a:schemeClr val="dk1"/>
                             </a:solidFill>
-                            <a:latin typeface="Cambria Math"/>
+                            <a:latin typeface="Cambria Math" panose="02040503050406030204" pitchFamily="18" charset="0"/>
                           </a:rPr>
                         </m:ctrlPr>
                       </m:sSubSupPr>
@@ -9754,7 +9732,7 @@
                             <a:solidFill>
                               <a:schemeClr val="dk1"/>
                             </a:solidFill>
-                            <a:latin typeface="Cambria Math"/>
+                            <a:latin typeface="Cambria Math" panose="02040503050406030204" pitchFamily="18" charset="0"/>
                           </a:rPr>
                         </m:ctrlPr>
                       </m:sSubPr>
@@ -9911,7 +9889,7 @@
                             <a:solidFill>
                               <a:schemeClr val="dk1"/>
                             </a:solidFill>
-                            <a:latin typeface="Cambria Math"/>
+                            <a:latin typeface="Cambria Math" panose="02040503050406030204" pitchFamily="18" charset="0"/>
                           </a:rPr>
                         </m:ctrlPr>
                       </m:sSubSupPr>
@@ -9968,7 +9946,7 @@
                             <a:solidFill>
                               <a:schemeClr val="dk1"/>
                             </a:solidFill>
-                            <a:latin typeface="Cambria Math"/>
+                            <a:latin typeface="Cambria Math" panose="02040503050406030204" pitchFamily="18" charset="0"/>
                           </a:rPr>
                         </m:ctrlPr>
                       </m:sSubSupPr>
@@ -10025,7 +10003,7 @@
                             <a:solidFill>
                               <a:schemeClr val="dk1"/>
                             </a:solidFill>
-                            <a:latin typeface="Cambria Math"/>
+                            <a:latin typeface="Cambria Math" panose="02040503050406030204" pitchFamily="18" charset="0"/>
                           </a:rPr>
                         </m:ctrlPr>
                       </m:sSubPr>
@@ -10163,7 +10141,7 @@
                               <a:solidFill>
                                 <a:schemeClr val="dk1"/>
                               </a:solidFill>
-                              <a:latin typeface="Cambria Math"/>
+                              <a:latin typeface="Cambria Math" panose="02040503050406030204" pitchFamily="18" charset="0"/>
                             </a:rPr>
                           </m:ctrlPr>
                         </m:sSubPr>
@@ -10214,7 +10192,7 @@
                               <a:solidFill>
                                 <a:schemeClr val="dk1"/>
                               </a:solidFill>
-                              <a:latin typeface="Cambria Math"/>
+                              <a:latin typeface="Cambria Math" panose="02040503050406030204" pitchFamily="18" charset="0"/>
                             </a:rPr>
                           </m:ctrlPr>
                         </m:dPr>
@@ -10226,7 +10204,7 @@
                                   <a:solidFill>
                                     <a:schemeClr val="dk1"/>
                                   </a:solidFill>
-                                  <a:latin typeface="Cambria Math"/>
+                                  <a:latin typeface="Cambria Math" panose="02040503050406030204" pitchFamily="18" charset="0"/>
                                 </a:rPr>
                               </m:ctrlPr>
                             </m:eqArrPr>
@@ -10241,7 +10219,7 @@
                                 <m:sSubSupPr>
                                   <m:ctrlPr>
                                     <a:rPr lang="en-US" sz="800" i="1" smtClean="0">
-                                      <a:latin typeface="Cambria Math"/>
+                                      <a:latin typeface="Cambria Math" panose="02040503050406030204" pitchFamily="18" charset="0"/>
                                     </a:rPr>
                                   </m:ctrlPr>
                                 </m:sSubSupPr>
@@ -10280,7 +10258,7 @@
                                 <m:sSubPr>
                                   <m:ctrlPr>
                                     <a:rPr lang="en-US" sz="800" i="1" smtClean="0">
-                                      <a:latin typeface="Cambria Math"/>
+                                      <a:latin typeface="Cambria Math" panose="02040503050406030204" pitchFamily="18" charset="0"/>
                                     </a:rPr>
                                   </m:ctrlPr>
                                 </m:sSubPr>
@@ -10323,7 +10301,7 @@
                                       <a:solidFill>
                                         <a:schemeClr val="dk1"/>
                                       </a:solidFill>
-                                      <a:latin typeface="Cambria Math"/>
+                                      <a:latin typeface="Cambria Math" panose="02040503050406030204" pitchFamily="18" charset="0"/>
                                     </a:rPr>
                                   </m:ctrlPr>
                                 </m:sSubPr>
@@ -10398,7 +10376,7 @@
                                 <m:sSubSupPr>
                                   <m:ctrlPr>
                                     <a:rPr lang="en-US" sz="800" i="1">
-                                      <a:latin typeface="Cambria Math"/>
+                                      <a:latin typeface="Cambria Math" panose="02040503050406030204" pitchFamily="18" charset="0"/>
                                     </a:rPr>
                                   </m:ctrlPr>
                                 </m:sSubSupPr>
@@ -10443,7 +10421,7 @@
                                 <m:sSubPr>
                                   <m:ctrlPr>
                                     <a:rPr lang="en-US" sz="800" i="1">
-                                      <a:latin typeface="Cambria Math"/>
+                                      <a:latin typeface="Cambria Math" panose="02040503050406030204" pitchFamily="18" charset="0"/>
                                     </a:rPr>
                                   </m:ctrlPr>
                                 </m:sSubPr>
@@ -10486,7 +10464,7 @@
                                 <m:sSubPr>
                                   <m:ctrlPr>
                                     <a:rPr lang="en-US" sz="800" i="1">
-                                      <a:latin typeface="Cambria Math"/>
+                                      <a:latin typeface="Cambria Math" panose="02040503050406030204" pitchFamily="18" charset="0"/>
                                     </a:rPr>
                                   </m:ctrlPr>
                                 </m:sSubPr>
@@ -10604,7 +10582,7 @@
           <a:graphicData uri="http://schemas.openxmlformats.org/presentationml/2006/ole">
             <mc:AlternateContent xmlns:mc="http://schemas.openxmlformats.org/markup-compatibility/2006">
               <mc:Choice xmlns:v="urn:schemas-microsoft-com:vml" Requires="v">
-                <p:oleObj spid="_x0000_s2063" name="Equation" r:id="rId12" imgW="1206360" imgH="241200" progId="Equation.DSMT4">
+                <p:oleObj spid="_x0000_s2064" name="Equation" r:id="rId12" imgW="1206360" imgH="241200" progId="Equation.DSMT4">
                   <p:embed/>
                 </p:oleObj>
               </mc:Choice>
@@ -10904,7 +10882,7 @@
                         <m:sSubPr>
                           <m:ctrlPr>
                             <a:rPr lang="en-US" i="1">
-                              <a:latin typeface="Cambria Math"/>
+                              <a:latin typeface="Cambria Math" panose="02040503050406030204" pitchFamily="18" charset="0"/>
                             </a:rPr>
                           </m:ctrlPr>
                         </m:sSubPr>
@@ -10941,7 +10919,7 @@
                         <m:fPr>
                           <m:ctrlPr>
                             <a:rPr lang="en-US" i="1">
-                              <a:latin typeface="Cambria Math"/>
+                              <a:latin typeface="Cambria Math" panose="02040503050406030204" pitchFamily="18" charset="0"/>
                             </a:rPr>
                           </m:ctrlPr>
                         </m:fPr>
@@ -10950,7 +10928,7 @@
                             <m:sSubPr>
                               <m:ctrlPr>
                                 <a:rPr lang="en-US" i="1">
-                                  <a:latin typeface="Cambria Math"/>
+                                  <a:latin typeface="Cambria Math" panose="02040503050406030204" pitchFamily="18" charset="0"/>
                                 </a:rPr>
                               </m:ctrlPr>
                             </m:sSubPr>
@@ -10977,7 +10955,7 @@
                             <m:sSubPr>
                               <m:ctrlPr>
                                 <a:rPr lang="en-US" i="1">
-                                  <a:latin typeface="Cambria Math"/>
+                                  <a:latin typeface="Cambria Math" panose="02040503050406030204" pitchFamily="18" charset="0"/>
                                 </a:rPr>
                               </m:ctrlPr>
                             </m:sSubPr>
@@ -11004,7 +10982,7 @@
                         <m:sSupPr>
                           <m:ctrlPr>
                             <a:rPr lang="en-US" i="1">
-                              <a:latin typeface="Cambria Math"/>
+                              <a:latin typeface="Cambria Math" panose="02040503050406030204" pitchFamily="18" charset="0"/>
                             </a:rPr>
                           </m:ctrlPr>
                         </m:sSupPr>
@@ -11013,7 +10991,7 @@
                             <m:dPr>
                               <m:ctrlPr>
                                 <a:rPr lang="en-US" i="1">
-                                  <a:latin typeface="Cambria Math"/>
+                                  <a:latin typeface="Cambria Math" panose="02040503050406030204" pitchFamily="18" charset="0"/>
                                 </a:rPr>
                               </m:ctrlPr>
                             </m:dPr>
@@ -11022,7 +11000,7 @@
                                 <m:fPr>
                                   <m:ctrlPr>
                                     <a:rPr lang="en-US" i="1">
-                                      <a:latin typeface="Cambria Math"/>
+                                      <a:latin typeface="Cambria Math" panose="02040503050406030204" pitchFamily="18" charset="0"/>
                                     </a:rPr>
                                   </m:ctrlPr>
                                 </m:fPr>
@@ -11031,7 +11009,7 @@
                                     <m:sSubPr>
                                       <m:ctrlPr>
                                         <a:rPr lang="en-US" i="1">
-                                          <a:latin typeface="Cambria Math"/>
+                                          <a:latin typeface="Cambria Math" panose="02040503050406030204" pitchFamily="18" charset="0"/>
                                         </a:rPr>
                                       </m:ctrlPr>
                                     </m:sSubPr>
@@ -11062,7 +11040,7 @@
                                     <m:sSubPr>
                                       <m:ctrlPr>
                                         <a:rPr lang="en-US" i="1">
-                                          <a:latin typeface="Cambria Math"/>
+                                          <a:latin typeface="Cambria Math" panose="02040503050406030204" pitchFamily="18" charset="0"/>
                                         </a:rPr>
                                       </m:ctrlPr>
                                     </m:sSubPr>
@@ -11179,10 +11157,9 @@
           <a:lstStyle/>
           <a:p>
             <a:r>
-              <a:rPr lang="en-US" sz="600" i="1" dirty="0" smtClean="0"/>
+              <a:rPr lang="en-US" sz="600" i="1" dirty="0"/>
               <a:t>ASHRAE Handbook of Fundamentals</a:t>
             </a:r>
-            <a:endParaRPr lang="en-US" sz="600" i="1" dirty="0"/>
           </a:p>
         </p:txBody>
       </p:sp>
@@ -11280,7 +11257,7 @@
                         <m:sSubPr>
                           <m:ctrlPr>
                             <a:rPr lang="en-US" i="1">
-                              <a:latin typeface="Cambria Math"/>
+                              <a:latin typeface="Cambria Math" panose="02040503050406030204" pitchFamily="18" charset="0"/>
                             </a:rPr>
                           </m:ctrlPr>
                         </m:sSubPr>
@@ -11410,7 +11387,7 @@
                         <m:sSubPr>
                           <m:ctrlPr>
                             <a:rPr lang="en-US" i="1">
-                              <a:latin typeface="Cambria Math"/>
+                              <a:latin typeface="Cambria Math" panose="02040503050406030204" pitchFamily="18" charset="0"/>
                             </a:rPr>
                           </m:ctrlPr>
                         </m:sSubPr>
@@ -11441,7 +11418,7 @@
                         <m:fPr>
                           <m:ctrlPr>
                             <a:rPr lang="en-US" i="1">
-                              <a:latin typeface="Cambria Math"/>
+                              <a:latin typeface="Cambria Math" panose="02040503050406030204" pitchFamily="18" charset="0"/>
                             </a:rPr>
                           </m:ctrlPr>
                         </m:fPr>
@@ -11450,7 +11427,7 @@
                             <m:sSubPr>
                               <m:ctrlPr>
                                 <a:rPr lang="en-US" i="1">
-                                  <a:latin typeface="Cambria Math"/>
+                                  <a:latin typeface="Cambria Math" panose="02040503050406030204" pitchFamily="18" charset="0"/>
                                 </a:rPr>
                               </m:ctrlPr>
                             </m:sSubPr>
@@ -11477,7 +11454,7 @@
                             <m:sSubPr>
                               <m:ctrlPr>
                                 <a:rPr lang="en-US" i="1">
-                                  <a:latin typeface="Cambria Math"/>
+                                  <a:latin typeface="Cambria Math" panose="02040503050406030204" pitchFamily="18" charset="0"/>
                                 </a:rPr>
                               </m:ctrlPr>
                             </m:sSubPr>
@@ -11622,15 +11599,15 @@
           <a:lstStyle/>
           <a:p>
             <a:r>
-              <a:rPr lang="en-US" sz="1200" i="1" dirty="0" smtClean="0"/>
+              <a:rPr lang="en-US" sz="1200" i="1" dirty="0"/>
               <a:t>Note: </a:t>
             </a:r>
             <a:r>
-              <a:rPr lang="en-US" sz="1200" i="1" dirty="0" err="1" smtClean="0"/>
+              <a:rPr lang="en-US" sz="1200" i="1" dirty="0" err="1"/>
               <a:t>R</a:t>
             </a:r>
             <a:r>
-              <a:rPr lang="en-US" sz="1200" i="1" baseline="-25000" dirty="0" err="1" smtClean="0"/>
+              <a:rPr lang="en-US" sz="1200" i="1" baseline="-25000" dirty="0" err="1"/>
               <a:t>clothing</a:t>
             </a:r>
             <a:r>
@@ -11638,10 +11615,9 @@
               <a:t> </a:t>
             </a:r>
             <a:r>
-              <a:rPr lang="en-US" sz="1200" i="1" dirty="0" smtClean="0"/>
+              <a:rPr lang="en-US" sz="1200" i="1" dirty="0"/>
               <a:t>remains constant, unless modified by the user – doesn’t automatically take into account sweat saturation, etc.</a:t>
             </a:r>
-            <a:endParaRPr lang="en-US" sz="1200" i="1" dirty="0"/>
           </a:p>
         </p:txBody>
       </p:sp>
@@ -11954,7 +11930,7 @@
                         <m:sSubPr>
                           <m:ctrlPr>
                             <a:rPr lang="en-US" i="1">
-                              <a:latin typeface="Cambria Math"/>
+                              <a:latin typeface="Cambria Math" panose="02040503050406030204" pitchFamily="18" charset="0"/>
                             </a:rPr>
                           </m:ctrlPr>
                         </m:sSubPr>
@@ -11985,7 +11961,7 @@
                         <m:sSupPr>
                           <m:ctrlPr>
                             <a:rPr lang="en-US" i="1">
-                              <a:latin typeface="Cambria Math"/>
+                              <a:latin typeface="Cambria Math" panose="02040503050406030204" pitchFamily="18" charset="0"/>
                             </a:rPr>
                           </m:ctrlPr>
                         </m:sSupPr>
@@ -12080,10 +12056,9 @@
           <a:lstStyle/>
           <a:p>
             <a:r>
-              <a:rPr lang="en-US" sz="600" i="1" dirty="0" smtClean="0"/>
+              <a:rPr lang="en-US" sz="600" i="1" dirty="0"/>
               <a:t>Dear, et al</a:t>
             </a:r>
-            <a:endParaRPr lang="en-US" sz="600" i="1" dirty="0"/>
           </a:p>
         </p:txBody>
       </p:sp>
@@ -12205,7 +12180,7 @@
                         <m:sSubPr>
                           <m:ctrlPr>
                             <a:rPr lang="en-US" i="1">
-                              <a:latin typeface="Cambria Math"/>
+                              <a:latin typeface="Cambria Math" panose="02040503050406030204" pitchFamily="18" charset="0"/>
                             </a:rPr>
                           </m:ctrlPr>
                         </m:sSubPr>
@@ -12236,7 +12211,7 @@
                         <m:fPr>
                           <m:ctrlPr>
                             <a:rPr lang="en-US" i="1">
-                              <a:latin typeface="Cambria Math"/>
+                              <a:latin typeface="Cambria Math" panose="02040503050406030204" pitchFamily="18" charset="0"/>
                             </a:rPr>
                           </m:ctrlPr>
                         </m:fPr>
@@ -12245,7 +12220,7 @@
                             <m:sSubPr>
                               <m:ctrlPr>
                                 <a:rPr lang="en-US" i="1">
-                                  <a:latin typeface="Cambria Math"/>
+                                  <a:latin typeface="Cambria Math" panose="02040503050406030204" pitchFamily="18" charset="0"/>
                                 </a:rPr>
                               </m:ctrlPr>
                             </m:sSubPr>
@@ -12272,7 +12247,7 @@
                             <m:sSubPr>
                               <m:ctrlPr>
                                 <a:rPr lang="en-US" i="1">
-                                  <a:latin typeface="Cambria Math"/>
+                                  <a:latin typeface="Cambria Math" panose="02040503050406030204" pitchFamily="18" charset="0"/>
                                 </a:rPr>
                               </m:ctrlPr>
                             </m:sSubPr>
@@ -12464,7 +12439,7 @@
                         <m:sSubPr>
                           <m:ctrlPr>
                             <a:rPr lang="en-US" i="1">
-                              <a:latin typeface="Cambria Math"/>
+                              <a:latin typeface="Cambria Math" panose="02040503050406030204" pitchFamily="18" charset="0"/>
                             </a:rPr>
                           </m:ctrlPr>
                         </m:sSubPr>
@@ -12702,7 +12677,7 @@
                         <m:sSubPr>
                           <m:ctrlPr>
                             <a:rPr lang="en-US" i="1">
-                              <a:latin typeface="Cambria Math"/>
+                              <a:latin typeface="Cambria Math" panose="02040503050406030204" pitchFamily="18" charset="0"/>
                             </a:rPr>
                           </m:ctrlPr>
                         </m:sSubPr>
@@ -12733,7 +12708,7 @@
                         <m:fPr>
                           <m:ctrlPr>
                             <a:rPr lang="en-US" i="1">
-                              <a:latin typeface="Cambria Math"/>
+                              <a:latin typeface="Cambria Math" panose="02040503050406030204" pitchFamily="18" charset="0"/>
                             </a:rPr>
                           </m:ctrlPr>
                         </m:fPr>
@@ -12742,7 +12717,7 @@
                             <m:sSubPr>
                               <m:ctrlPr>
                                 <a:rPr lang="en-US" i="1">
-                                  <a:latin typeface="Cambria Math"/>
+                                  <a:latin typeface="Cambria Math" panose="02040503050406030204" pitchFamily="18" charset="0"/>
                                 </a:rPr>
                               </m:ctrlPr>
                             </m:sSubPr>
@@ -12769,7 +12744,7 @@
                             <m:sSubPr>
                               <m:ctrlPr>
                                 <a:rPr lang="en-US" i="1">
-                                  <a:latin typeface="Cambria Math"/>
+                                  <a:latin typeface="Cambria Math" panose="02040503050406030204" pitchFamily="18" charset="0"/>
                                 </a:rPr>
                               </m:ctrlPr>
                             </m:sSubPr>
@@ -13064,7 +13039,7 @@
                         <m:sSubPr>
                           <m:ctrlPr>
                             <a:rPr lang="en-US" i="1">
-                              <a:latin typeface="Cambria Math"/>
+                              <a:latin typeface="Cambria Math" panose="02040503050406030204" pitchFamily="18" charset="0"/>
                             </a:rPr>
                           </m:ctrlPr>
                         </m:sSubPr>
@@ -13095,7 +13070,7 @@
                         <m:sSubPr>
                           <m:ctrlPr>
                             <a:rPr lang="en-US" i="1">
-                              <a:latin typeface="Cambria Math"/>
+                              <a:latin typeface="Cambria Math" panose="02040503050406030204" pitchFamily="18" charset="0"/>
                             </a:rPr>
                           </m:ctrlPr>
                         </m:sSubPr>
@@ -13120,7 +13095,7 @@
                         <m:sSubPr>
                           <m:ctrlPr>
                             <a:rPr lang="en-US" i="1">
-                              <a:latin typeface="Cambria Math"/>
+                              <a:latin typeface="Cambria Math" panose="02040503050406030204" pitchFamily="18" charset="0"/>
                             </a:rPr>
                           </m:ctrlPr>
                         </m:sSubPr>
@@ -13145,7 +13120,7 @@
                         <m:dPr>
                           <m:ctrlPr>
                             <a:rPr lang="en-US" i="1">
-                              <a:latin typeface="Cambria Math"/>
+                              <a:latin typeface="Cambria Math" panose="02040503050406030204" pitchFamily="18" charset="0"/>
                             </a:rPr>
                           </m:ctrlPr>
                         </m:dPr>
@@ -13154,7 +13129,7 @@
                             <m:sSubPr>
                               <m:ctrlPr>
                                 <a:rPr lang="en-US" i="1">
-                                  <a:latin typeface="Cambria Math"/>
+                                  <a:latin typeface="Cambria Math" panose="02040503050406030204" pitchFamily="18" charset="0"/>
                                 </a:rPr>
                               </m:ctrlPr>
                             </m:sSubPr>
@@ -13197,7 +13172,7 @@
                             <m:sSubPr>
                               <m:ctrlPr>
                                 <a:rPr lang="en-US" i="1">
-                                  <a:latin typeface="Cambria Math"/>
+                                  <a:latin typeface="Cambria Math" panose="02040503050406030204" pitchFamily="18" charset="0"/>
                                 </a:rPr>
                               </m:ctrlPr>
                             </m:sSubPr>
@@ -13389,7 +13364,7 @@
                         <m:sSubPr>
                           <m:ctrlPr>
                             <a:rPr lang="en-US" i="1">
-                              <a:latin typeface="Cambria Math"/>
+                              <a:latin typeface="Cambria Math" panose="02040503050406030204" pitchFamily="18" charset="0"/>
                             </a:rPr>
                           </m:ctrlPr>
                         </m:sSubPr>
@@ -13420,7 +13395,7 @@
                         <m:sSubPr>
                           <m:ctrlPr>
                             <a:rPr lang="en-US" i="1">
-                              <a:latin typeface="Cambria Math"/>
+                              <a:latin typeface="Cambria Math" panose="02040503050406030204" pitchFamily="18" charset="0"/>
                             </a:rPr>
                           </m:ctrlPr>
                         </m:sSubPr>
@@ -13451,7 +13426,7 @@
                         <m:sSubPr>
                           <m:ctrlPr>
                             <a:rPr lang="en-US" i="1">
-                              <a:latin typeface="Cambria Math"/>
+                              <a:latin typeface="Cambria Math" panose="02040503050406030204" pitchFamily="18" charset="0"/>
                             </a:rPr>
                           </m:ctrlPr>
                         </m:sSubPr>
@@ -13641,7 +13616,7 @@
                         <m:sSubPr>
                           <m:ctrlPr>
                             <a:rPr lang="en-US" i="1">
-                              <a:latin typeface="Cambria Math"/>
+                              <a:latin typeface="Cambria Math" panose="02040503050406030204" pitchFamily="18" charset="0"/>
                             </a:rPr>
                           </m:ctrlPr>
                         </m:sSubPr>
@@ -13672,7 +13647,7 @@
                         <m:sSubPr>
                           <m:ctrlPr>
                             <a:rPr lang="en-US" i="1">
-                              <a:latin typeface="Cambria Math"/>
+                              <a:latin typeface="Cambria Math" panose="02040503050406030204" pitchFamily="18" charset="0"/>
                             </a:rPr>
                           </m:ctrlPr>
                         </m:sSubPr>
@@ -13682,7 +13657,7 @@
                               <m:chr m:val="̇"/>
                               <m:ctrlPr>
                                 <a:rPr lang="en-US" i="1">
-                                  <a:latin typeface="Cambria Math"/>
+                                  <a:latin typeface="Cambria Math" panose="02040503050406030204" pitchFamily="18" charset="0"/>
                                 </a:rPr>
                               </m:ctrlPr>
                             </m:accPr>
@@ -13709,7 +13684,7 @@
                         <m:sSubPr>
                           <m:ctrlPr>
                             <a:rPr lang="en-US" i="1">
-                              <a:latin typeface="Cambria Math"/>
+                              <a:latin typeface="Cambria Math" panose="02040503050406030204" pitchFamily="18" charset="0"/>
                             </a:rPr>
                           </m:ctrlPr>
                         </m:sSubPr>
@@ -13899,7 +13874,7 @@
                         <m:sSubPr>
                           <m:ctrlPr>
                             <a:rPr lang="en-US" i="1">
-                              <a:latin typeface="Cambria Math"/>
+                              <a:latin typeface="Cambria Math" panose="02040503050406030204" pitchFamily="18" charset="0"/>
                             </a:rPr>
                           </m:ctrlPr>
                         </m:sSubPr>
@@ -13930,7 +13905,7 @@
                         <m:dPr>
                           <m:ctrlPr>
                             <a:rPr lang="en-US" i="1">
-                              <a:latin typeface="Cambria Math"/>
+                              <a:latin typeface="Cambria Math" panose="02040503050406030204" pitchFamily="18" charset="0"/>
                             </a:rPr>
                           </m:ctrlPr>
                         </m:dPr>
@@ -13945,7 +13920,7 @@
                             <m:sSubPr>
                               <m:ctrlPr>
                                 <a:rPr lang="en-US" i="1">
-                                  <a:latin typeface="Cambria Math"/>
+                                  <a:latin typeface="Cambria Math" panose="02040503050406030204" pitchFamily="18" charset="0"/>
                                 </a:rPr>
                               </m:ctrlPr>
                             </m:sSubPr>
@@ -13978,7 +13953,7 @@
                         <m:sSubPr>
                           <m:ctrlPr>
                             <a:rPr lang="en-US" i="1">
-                              <a:latin typeface="Cambria Math"/>
+                              <a:latin typeface="Cambria Math" panose="02040503050406030204" pitchFamily="18" charset="0"/>
                             </a:rPr>
                           </m:ctrlPr>
                         </m:sSubPr>
@@ -14168,7 +14143,7 @@
                         <m:sSubPr>
                           <m:ctrlPr>
                             <a:rPr lang="en-US" i="1">
-                              <a:latin typeface="Cambria Math"/>
+                              <a:latin typeface="Cambria Math" panose="02040503050406030204" pitchFamily="18" charset="0"/>
                             </a:rPr>
                           </m:ctrlPr>
                         </m:sSubPr>
@@ -14199,7 +14174,7 @@
                         <m:fPr>
                           <m:ctrlPr>
                             <a:rPr lang="en-US" i="1">
-                              <a:latin typeface="Cambria Math"/>
+                              <a:latin typeface="Cambria Math" panose="02040503050406030204" pitchFamily="18" charset="0"/>
                             </a:rPr>
                           </m:ctrlPr>
                         </m:fPr>
@@ -14208,7 +14183,7 @@
                             <m:sSubPr>
                               <m:ctrlPr>
                                 <a:rPr lang="en-US" i="1">
-                                  <a:latin typeface="Cambria Math"/>
+                                  <a:latin typeface="Cambria Math" panose="02040503050406030204" pitchFamily="18" charset="0"/>
                                 </a:rPr>
                               </m:ctrlPr>
                             </m:sSubPr>
@@ -14235,7 +14210,7 @@
                             <m:sSubPr>
                               <m:ctrlPr>
                                 <a:rPr lang="en-US" i="1">
-                                  <a:latin typeface="Cambria Math"/>
+                                  <a:latin typeface="Cambria Math" panose="02040503050406030204" pitchFamily="18" charset="0"/>
                                 </a:rPr>
                               </m:ctrlPr>
                             </m:sSubPr>
@@ -14427,7 +14402,7 @@
                         <m:sSubPr>
                           <m:ctrlPr>
                             <a:rPr lang="en-US" i="1">
-                              <a:latin typeface="Cambria Math"/>
+                              <a:latin typeface="Cambria Math" panose="02040503050406030204" pitchFamily="18" charset="0"/>
                             </a:rPr>
                           </m:ctrlPr>
                         </m:sSubPr>
@@ -14464,7 +14439,7 @@
                         <m:sSubPr>
                           <m:ctrlPr>
                             <a:rPr lang="en-US" i="1">
-                              <a:latin typeface="Cambria Math"/>
+                              <a:latin typeface="Cambria Math" panose="02040503050406030204" pitchFamily="18" charset="0"/>
                             </a:rPr>
                           </m:ctrlPr>
                         </m:sSubPr>
@@ -14560,13 +14535,8 @@
           <a:p>
             <a:r>
               <a:rPr lang="en-US" sz="600" i="1" dirty="0"/>
-              <a:t>ASHRAE Handbook of </a:t>
-            </a:r>
-            <a:r>
-              <a:rPr lang="en-US" sz="600" i="1" dirty="0" smtClean="0"/>
-              <a:t>Fundamentals</a:t>
-            </a:r>
-            <a:endParaRPr lang="en-US" sz="600" i="1" dirty="0"/>
+              <a:t>ASHRAE Handbook of Fundamentals</a:t>
+            </a:r>
           </a:p>
         </p:txBody>
       </p:sp>
@@ -14594,13 +14564,8 @@
           <a:p>
             <a:r>
               <a:rPr lang="en-US" sz="600" i="1" dirty="0"/>
-              <a:t>ASHRAE Handbook of </a:t>
-            </a:r>
-            <a:r>
-              <a:rPr lang="en-US" sz="600" i="1" dirty="0" smtClean="0"/>
-              <a:t>Fundamentals</a:t>
-            </a:r>
-            <a:endParaRPr lang="en-US" sz="600" i="1" dirty="0"/>
+              <a:t>ASHRAE Handbook of Fundamentals</a:t>
+            </a:r>
           </a:p>
         </p:txBody>
       </p:sp>
@@ -14628,13 +14593,8 @@
           <a:p>
             <a:r>
               <a:rPr lang="en-US" sz="600" i="1" dirty="0"/>
-              <a:t>ASHRAE Handbook of </a:t>
-            </a:r>
-            <a:r>
-              <a:rPr lang="en-US" sz="600" i="1" dirty="0" smtClean="0"/>
-              <a:t>Fundamentals</a:t>
-            </a:r>
-            <a:endParaRPr lang="en-US" sz="600" i="1" dirty="0"/>
+              <a:t>ASHRAE Handbook of Fundamentals</a:t>
+            </a:r>
           </a:p>
         </p:txBody>
       </p:sp>
@@ -14662,13 +14622,8 @@
           <a:p>
             <a:r>
               <a:rPr lang="en-US" sz="600" i="1" dirty="0"/>
-              <a:t>ASHRAE Handbook of </a:t>
-            </a:r>
-            <a:r>
-              <a:rPr lang="en-US" sz="600" i="1" dirty="0" smtClean="0"/>
-              <a:t>Fundamentals</a:t>
-            </a:r>
-            <a:endParaRPr lang="en-US" sz="600" i="1" dirty="0"/>
+              <a:t>ASHRAE Handbook of Fundamentals</a:t>
+            </a:r>
           </a:p>
         </p:txBody>
       </p:sp>
@@ -14725,13 +14680,8 @@
           <a:p>
             <a:r>
               <a:rPr lang="en-US" sz="600" i="1" dirty="0"/>
-              <a:t>ASHRAE Handbook of </a:t>
-            </a:r>
-            <a:r>
-              <a:rPr lang="en-US" sz="600" i="1" dirty="0" smtClean="0"/>
-              <a:t>Fundamentals</a:t>
-            </a:r>
-            <a:endParaRPr lang="en-US" sz="600" i="1" dirty="0"/>
+              <a:t>ASHRAE Handbook of Fundamentals</a:t>
+            </a:r>
           </a:p>
         </p:txBody>
       </p:sp>
@@ -14889,7 +14839,7 @@
                         <m:sSubPr>
                           <m:ctrlPr>
                             <a:rPr lang="en-US" i="1">
-                              <a:latin typeface="Cambria Math"/>
+                              <a:latin typeface="Cambria Math" panose="02040503050406030204" pitchFamily="18" charset="0"/>
                             </a:rPr>
                           </m:ctrlPr>
                         </m:sSubPr>
@@ -14898,7 +14848,7 @@
                             <m:sSubPr>
                               <m:ctrlPr>
                                 <a:rPr lang="en-US" i="1">
-                                  <a:latin typeface="Cambria Math"/>
+                                  <a:latin typeface="Cambria Math" panose="02040503050406030204" pitchFamily="18" charset="0"/>
                                 </a:rPr>
                               </m:ctrlPr>
                             </m:sSubPr>
@@ -14929,7 +14879,7 @@
                             <m:sSubPr>
                               <m:ctrlPr>
                                 <a:rPr lang="en-US" i="1">
-                                  <a:latin typeface="Cambria Math"/>
+                                  <a:latin typeface="Cambria Math" panose="02040503050406030204" pitchFamily="18" charset="0"/>
                                 </a:rPr>
                               </m:ctrlPr>
                             </m:sSubPr>
@@ -15135,7 +15085,7 @@
                         <m:sSubPr>
                           <m:ctrlPr>
                             <a:rPr lang="en-US" i="1">
-                              <a:latin typeface="Cambria Math"/>
+                              <a:latin typeface="Cambria Math" panose="02040503050406030204" pitchFamily="18" charset="0"/>
                             </a:rPr>
                           </m:ctrlPr>
                         </m:sSubPr>
@@ -15166,7 +15116,7 @@
                         <m:fPr>
                           <m:ctrlPr>
                             <a:rPr lang="en-US" i="1">
-                              <a:latin typeface="Cambria Math"/>
+                              <a:latin typeface="Cambria Math" panose="02040503050406030204" pitchFamily="18" charset="0"/>
                             </a:rPr>
                           </m:ctrlPr>
                         </m:fPr>
@@ -15189,7 +15139,7 @@
                             <m:sSubPr>
                               <m:ctrlPr>
                                 <a:rPr lang="en-US" i="1">
-                                  <a:latin typeface="Cambria Math"/>
+                                  <a:latin typeface="Cambria Math" panose="02040503050406030204" pitchFamily="18" charset="0"/>
                                 </a:rPr>
                               </m:ctrlPr>
                             </m:sSubPr>
@@ -15214,7 +15164,7 @@
                             <m:sSubPr>
                               <m:ctrlPr>
                                 <a:rPr lang="en-US" i="1">
-                                  <a:latin typeface="Cambria Math"/>
+                                  <a:latin typeface="Cambria Math" panose="02040503050406030204" pitchFamily="18" charset="0"/>
                                 </a:rPr>
                               </m:ctrlPr>
                             </m:sSubPr>
@@ -15682,7 +15632,7 @@
                         <m:dPr>
                           <m:ctrlPr>
                             <a:rPr lang="en-US" i="1">
-                              <a:latin typeface="Cambria Math"/>
+                              <a:latin typeface="Cambria Math" panose="02040503050406030204" pitchFamily="18" charset="0"/>
                             </a:rPr>
                           </m:ctrlPr>
                         </m:dPr>
@@ -15709,7 +15659,7 @@
                             <m:sSupPr>
                               <m:ctrlPr>
                                 <a:rPr lang="en-US" i="1">
-                                  <a:latin typeface="Cambria Math"/>
+                                  <a:latin typeface="Cambria Math" panose="02040503050406030204" pitchFamily="18" charset="0"/>
                                 </a:rPr>
                               </m:ctrlPr>
                             </m:sSupPr>
@@ -15913,7 +15863,7 @@
                         <m:fPr>
                           <m:ctrlPr>
                             <a:rPr lang="en-US" i="1">
-                              <a:latin typeface="Cambria Math"/>
+                              <a:latin typeface="Cambria Math" panose="02040503050406030204" pitchFamily="18" charset="0"/>
                             </a:rPr>
                           </m:ctrlPr>
                         </m:fPr>
@@ -15922,7 +15872,7 @@
                             <m:sSubPr>
                               <m:ctrlPr>
                                 <a:rPr lang="en-US" i="1">
-                                  <a:latin typeface="Cambria Math"/>
+                                  <a:latin typeface="Cambria Math" panose="02040503050406030204" pitchFamily="18" charset="0"/>
                                 </a:rPr>
                               </m:ctrlPr>
                             </m:sSubPr>
@@ -16040,30 +15990,29 @@
           <a:lstStyle/>
           <a:p>
             <a:r>
-              <a:rPr lang="en-US" sz="1200" i="1" dirty="0" smtClean="0"/>
+              <a:rPr lang="en-US" sz="1200" i="1" dirty="0"/>
               <a:t>Assumes water pressure of 0.1 </a:t>
             </a:r>
             <a:r>
-              <a:rPr lang="en-US" sz="1200" i="1" dirty="0" err="1" smtClean="0"/>
+              <a:rPr lang="en-US" sz="1200" i="1" dirty="0" err="1"/>
               <a:t>MPa</a:t>
             </a:r>
             <a:r>
-              <a:rPr lang="en-US" sz="1200" i="1" dirty="0" smtClean="0"/>
+              <a:rPr lang="en-US" sz="1200" i="1" dirty="0"/>
               <a:t> (sea level)</a:t>
             </a:r>
-            <a:endParaRPr lang="en-US" sz="1200" i="1" dirty="0"/>
-          </a:p>
-          <a:p>
-            <a:r>
-              <a:rPr lang="en-US" sz="1200" i="1" dirty="0" err="1" smtClean="0"/>
+          </a:p>
+          <a:p>
+            <a:r>
+              <a:rPr lang="en-US" sz="1200" i="1" dirty="0" err="1"/>
               <a:t>R</a:t>
             </a:r>
             <a:r>
-              <a:rPr lang="en-US" sz="1200" i="1" baseline="-25000" dirty="0" err="1" smtClean="0"/>
+              <a:rPr lang="en-US" sz="1200" i="1" baseline="-25000" dirty="0" err="1"/>
               <a:t>cl</a:t>
             </a:r>
             <a:r>
-              <a:rPr lang="en-US" sz="1200" i="1" dirty="0" smtClean="0"/>
+              <a:rPr lang="en-US" sz="1200" i="1" dirty="0"/>
               <a:t> for submerged – different than in air</a:t>
             </a:r>
           </a:p>
@@ -16073,7 +16022,7 @@
               <a:buChar char="•"/>
             </a:pPr>
             <a:r>
-              <a:rPr lang="en-US" sz="1200" i="1" dirty="0" smtClean="0"/>
+              <a:rPr lang="en-US" sz="1200" i="1" dirty="0"/>
               <a:t>Like a wet suit</a:t>
             </a:r>
           </a:p>
@@ -16083,7 +16032,7 @@
               <a:buChar char="•"/>
             </a:pPr>
             <a:r>
-              <a:rPr lang="en-US" sz="1200" i="1" dirty="0" smtClean="0"/>
+              <a:rPr lang="en-US" sz="1200" i="1" dirty="0"/>
               <a:t>I have a paper with wet suit values</a:t>
             </a:r>
           </a:p>
@@ -16112,14 +16061,13 @@
           <a:lstStyle/>
           <a:p>
             <a:r>
-              <a:rPr lang="en-US" sz="600" i="1" dirty="0" err="1" smtClean="0"/>
+              <a:rPr lang="en-US" sz="600" i="1" dirty="0" err="1"/>
               <a:t>Ramires</a:t>
             </a:r>
             <a:r>
-              <a:rPr lang="en-US" sz="600" i="1" dirty="0" smtClean="0"/>
+              <a:rPr lang="en-US" sz="600" i="1" dirty="0"/>
               <a:t>, et al</a:t>
             </a:r>
-            <a:endParaRPr lang="en-US" sz="600" i="1" dirty="0"/>
           </a:p>
         </p:txBody>
       </p:sp>
@@ -16159,10 +16107,9 @@
           <a:lstStyle/>
           <a:p>
             <a:r>
-              <a:rPr lang="en-US" sz="1200" i="1" dirty="0" smtClean="0"/>
+              <a:rPr lang="en-US" sz="1200" i="1" dirty="0"/>
               <a:t>Assumes radiation and evaporation are negligible</a:t>
             </a:r>
-            <a:endParaRPr lang="en-US" sz="1200" i="1" dirty="0"/>
           </a:p>
         </p:txBody>
       </p:sp>
@@ -16279,7 +16226,7 @@
                       <m:sSubPr>
                         <m:ctrlPr>
                           <a:rPr lang="en-US" i="1">
-                            <a:latin typeface="Cambria Math"/>
+                            <a:latin typeface="Cambria Math" panose="02040503050406030204" pitchFamily="18" charset="0"/>
                           </a:rPr>
                         </m:ctrlPr>
                       </m:sSubPr>
@@ -16303,10 +16250,9 @@
                   </m:oMath>
                 </a14:m>
                 <a:r>
-                  <a:rPr lang="en-US" dirty="0" smtClean="0"/>
+                  <a:rPr lang="en-US" dirty="0"/>
                   <a:t> when saturated</a:t>
                 </a:r>
-                <a:endParaRPr lang="en-US" dirty="0"/>
               </a:p>
             </p:txBody>
           </p:sp>
@@ -16472,7 +16418,7 @@
                         <m:sSubPr>
                           <m:ctrlPr>
                             <a:rPr lang="en-US" i="1">
-                              <a:latin typeface="Cambria Math"/>
+                              <a:latin typeface="Cambria Math" panose="02040503050406030204" pitchFamily="18" charset="0"/>
                             </a:rPr>
                           </m:ctrlPr>
                         </m:sSubPr>
@@ -16704,7 +16650,7 @@
                         <m:sSubPr>
                           <m:ctrlPr>
                             <a:rPr lang="en-US" i="1">
-                              <a:latin typeface="Cambria Math"/>
+                              <a:latin typeface="Cambria Math" panose="02040503050406030204" pitchFamily="18" charset="0"/>
                             </a:rPr>
                           </m:ctrlPr>
                         </m:sSubPr>
@@ -16735,7 +16681,7 @@
                         <m:fPr>
                           <m:ctrlPr>
                             <a:rPr lang="en-US" i="1">
-                              <a:latin typeface="Cambria Math"/>
+                              <a:latin typeface="Cambria Math" panose="02040503050406030204" pitchFamily="18" charset="0"/>
                             </a:rPr>
                           </m:ctrlPr>
                         </m:fPr>
@@ -16744,7 +16690,7 @@
                             <m:sSubPr>
                               <m:ctrlPr>
                                 <a:rPr lang="en-US" i="1">
-                                  <a:latin typeface="Cambria Math"/>
+                                  <a:latin typeface="Cambria Math" panose="02040503050406030204" pitchFamily="18" charset="0"/>
                                 </a:rPr>
                               </m:ctrlPr>
                             </m:sSubPr>
@@ -16771,7 +16717,7 @@
                             <m:sSubPr>
                               <m:ctrlPr>
                                 <a:rPr lang="en-US" i="1">
-                                  <a:latin typeface="Cambria Math"/>
+                                  <a:latin typeface="Cambria Math" panose="02040503050406030204" pitchFamily="18" charset="0"/>
                                 </a:rPr>
                               </m:ctrlPr>
                             </m:sSubPr>
@@ -16963,7 +16909,7 @@
                         <m:sSubPr>
                           <m:ctrlPr>
                             <a:rPr lang="en-US" i="1">
-                              <a:latin typeface="Cambria Math"/>
+                              <a:latin typeface="Cambria Math" panose="02040503050406030204" pitchFamily="18" charset="0"/>
                             </a:rPr>
                           </m:ctrlPr>
                         </m:sSubPr>
@@ -17159,7 +17105,7 @@
                         <m:sSubPr>
                           <m:ctrlPr>
                             <a:rPr lang="en-US" i="1">
-                              <a:latin typeface="Cambria Math"/>
+                              <a:latin typeface="Cambria Math" panose="02040503050406030204" pitchFamily="18" charset="0"/>
                             </a:rPr>
                           </m:ctrlPr>
                         </m:sSubPr>
@@ -17190,7 +17136,7 @@
                         <m:dPr>
                           <m:ctrlPr>
                             <a:rPr lang="en-US" i="1">
-                              <a:latin typeface="Cambria Math"/>
+                              <a:latin typeface="Cambria Math" panose="02040503050406030204" pitchFamily="18" charset="0"/>
                             </a:rPr>
                           </m:ctrlPr>
                         </m:dPr>
@@ -17295,14 +17241,13 @@
           <a:lstStyle/>
           <a:p>
             <a:r>
-              <a:rPr lang="en-US" sz="600" i="1" dirty="0" err="1" smtClean="0"/>
+              <a:rPr lang="en-US" sz="600" i="1" dirty="0" err="1"/>
               <a:t>Boutelier</a:t>
             </a:r>
             <a:r>
-              <a:rPr lang="en-US" sz="600" i="1" dirty="0" smtClean="0"/>
+              <a:rPr lang="en-US" sz="600" i="1" dirty="0"/>
               <a:t> et. al</a:t>
             </a:r>
-            <a:endParaRPr lang="en-US" sz="600" i="1" dirty="0"/>
           </a:p>
         </p:txBody>
       </p:sp>
@@ -17436,7 +17381,7 @@
                         <m:fPr>
                           <m:ctrlPr>
                             <a:rPr lang="en-US" i="1">
-                              <a:latin typeface="Cambria Math"/>
+                              <a:latin typeface="Cambria Math" panose="02040503050406030204" pitchFamily="18" charset="0"/>
                             </a:rPr>
                           </m:ctrlPr>
                         </m:fPr>
@@ -17460,7 +17405,7 @@
                             <m:dPr>
                               <m:ctrlPr>
                                 <a:rPr lang="en-US" i="1">
-                                  <a:latin typeface="Cambria Math"/>
+                                  <a:latin typeface="Cambria Math" panose="02040503050406030204" pitchFamily="18" charset="0"/>
                                 </a:rPr>
                               </m:ctrlPr>
                             </m:dPr>
@@ -17469,7 +17414,7 @@
                                 <m:sSubPr>
                                   <m:ctrlPr>
                                     <a:rPr lang="en-US" i="1">
-                                      <a:latin typeface="Cambria Math"/>
+                                      <a:latin typeface="Cambria Math" panose="02040503050406030204" pitchFamily="18" charset="0"/>
                                     </a:rPr>
                                   </m:ctrlPr>
                                 </m:sSubPr>
@@ -17500,7 +17445,7 @@
                                 <m:sSubPr>
                                   <m:ctrlPr>
                                     <a:rPr lang="en-US" i="1">
-                                      <a:latin typeface="Cambria Math"/>
+                                      <a:latin typeface="Cambria Math" panose="02040503050406030204" pitchFamily="18" charset="0"/>
                                     </a:rPr>
                                   </m:ctrlPr>
                                 </m:sSubPr>
@@ -17527,7 +17472,7 @@
                             <m:sSupPr>
                               <m:ctrlPr>
                                 <a:rPr lang="en-US" i="1">
-                                  <a:latin typeface="Cambria Math"/>
+                                  <a:latin typeface="Cambria Math" panose="02040503050406030204" pitchFamily="18" charset="0"/>
                                 </a:rPr>
                               </m:ctrlPr>
                             </m:sSupPr>
@@ -17554,7 +17499,7 @@
                             <m:sSupPr>
                               <m:ctrlPr>
                                 <a:rPr lang="en-US" i="1">
-                                  <a:latin typeface="Cambria Math"/>
+                                  <a:latin typeface="Cambria Math" panose="02040503050406030204" pitchFamily="18" charset="0"/>
                                 </a:rPr>
                               </m:ctrlPr>
                             </m:sSupPr>
@@ -17761,7 +17706,7 @@
                         <m:fPr>
                           <m:ctrlPr>
                             <a:rPr lang="en-US" i="1">
-                              <a:latin typeface="Cambria Math"/>
+                              <a:latin typeface="Cambria Math" panose="02040503050406030204" pitchFamily="18" charset="0"/>
                             </a:rPr>
                           </m:ctrlPr>
                         </m:fPr>
@@ -17770,7 +17715,7 @@
                             <m:sSubPr>
                               <m:ctrlPr>
                                 <a:rPr lang="en-US" i="1">
-                                  <a:latin typeface="Cambria Math"/>
+                                  <a:latin typeface="Cambria Math" panose="02040503050406030204" pitchFamily="18" charset="0"/>
                                 </a:rPr>
                               </m:ctrlPr>
                             </m:sSubPr>
@@ -18000,7 +17945,7 @@
                         <m:fPr>
                           <m:ctrlPr>
                             <a:rPr lang="en-US" i="1">
-                              <a:latin typeface="Cambria Math"/>
+                              <a:latin typeface="Cambria Math" panose="02040503050406030204" pitchFamily="18" charset="0"/>
                             </a:rPr>
                           </m:ctrlPr>
                         </m:fPr>
@@ -18400,7 +18345,7 @@
                         <m:sSubPr>
                           <m:ctrlPr>
                             <a:rPr lang="en-US" i="1">
-                              <a:latin typeface="Cambria Math"/>
+                              <a:latin typeface="Cambria Math" panose="02040503050406030204" pitchFamily="18" charset="0"/>
                             </a:rPr>
                           </m:ctrlPr>
                         </m:sSubPr>
@@ -18443,7 +18388,7 @@
                         <m:sSubPr>
                           <m:ctrlPr>
                             <a:rPr lang="en-US" i="1">
-                              <a:latin typeface="Cambria Math"/>
+                              <a:latin typeface="Cambria Math" panose="02040503050406030204" pitchFamily="18" charset="0"/>
                             </a:rPr>
                           </m:ctrlPr>
                         </m:sSubPr>
@@ -18453,7 +18398,7 @@
                               <m:chr m:val="̇"/>
                               <m:ctrlPr>
                                 <a:rPr lang="en-US" i="1">
-                                  <a:latin typeface="Cambria Math"/>
+                                  <a:latin typeface="Cambria Math" panose="02040503050406030204" pitchFamily="18" charset="0"/>
                                 </a:rPr>
                               </m:ctrlPr>
                             </m:accPr>
@@ -18486,7 +18431,7 @@
                         <m:sSubPr>
                           <m:ctrlPr>
                             <a:rPr lang="en-US" i="1">
-                              <a:latin typeface="Cambria Math"/>
+                              <a:latin typeface="Cambria Math" panose="02040503050406030204" pitchFamily="18" charset="0"/>
                             </a:rPr>
                           </m:ctrlPr>
                         </m:sSubPr>
@@ -18511,7 +18456,7 @@
                         <m:dPr>
                           <m:ctrlPr>
                             <a:rPr lang="en-US" i="1">
-                              <a:latin typeface="Cambria Math"/>
+                              <a:latin typeface="Cambria Math" panose="02040503050406030204" pitchFamily="18" charset="0"/>
                             </a:rPr>
                           </m:ctrlPr>
                         </m:dPr>
@@ -18520,7 +18465,7 @@
                             <m:sSubPr>
                               <m:ctrlPr>
                                 <a:rPr lang="en-US" i="1">
-                                  <a:latin typeface="Cambria Math"/>
+                                  <a:latin typeface="Cambria Math" panose="02040503050406030204" pitchFamily="18" charset="0"/>
                                 </a:rPr>
                               </m:ctrlPr>
                             </m:sSubPr>
@@ -18551,7 +18496,7 @@
                             <m:sSubPr>
                               <m:ctrlPr>
                                 <a:rPr lang="en-US" i="1">
-                                  <a:latin typeface="Cambria Math"/>
+                                  <a:latin typeface="Cambria Math" panose="02040503050406030204" pitchFamily="18" charset="0"/>
                                 </a:rPr>
                               </m:ctrlPr>
                             </m:sSubPr>
@@ -18660,19 +18605,15 @@
           <a:lstStyle/>
           <a:p>
             <a:r>
-              <a:rPr lang="en-US" sz="600" i="1" dirty="0" err="1" smtClean="0"/>
+              <a:rPr lang="en-US" sz="600" i="1" dirty="0" err="1"/>
               <a:t>Shitzer</a:t>
             </a:r>
             <a:r>
               <a:rPr lang="en-US" sz="600" i="1" dirty="0"/>
-              <a:t> </a:t>
-            </a:r>
-            <a:r>
-              <a:rPr lang="en-US" sz="600" i="1" dirty="0" smtClean="0"/>
-              <a:t>&amp; </a:t>
-            </a:r>
-            <a:r>
-              <a:rPr lang="en-US" sz="600" i="1" dirty="0" err="1" smtClean="0"/>
+              <a:t> &amp; </a:t>
+            </a:r>
+            <a:r>
+              <a:rPr lang="en-US" sz="600" i="1" dirty="0" err="1"/>
               <a:t>Eberhart</a:t>
             </a:r>
             <a:endParaRPr lang="en-US" sz="600" i="1" dirty="0"/>
@@ -18797,7 +18738,7 @@
                         <m:sSubPr>
                           <m:ctrlPr>
                             <a:rPr lang="en-US" i="1">
-                              <a:latin typeface="Cambria Math"/>
+                              <a:latin typeface="Cambria Math" panose="02040503050406030204" pitchFamily="18" charset="0"/>
                             </a:rPr>
                           </m:ctrlPr>
                         </m:sSubPr>
@@ -18828,7 +18769,7 @@
                         <m:sSubPr>
                           <m:ctrlPr>
                             <a:rPr lang="en-US" i="1">
-                              <a:latin typeface="Cambria Math"/>
+                              <a:latin typeface="Cambria Math" panose="02040503050406030204" pitchFamily="18" charset="0"/>
                             </a:rPr>
                           </m:ctrlPr>
                         </m:sSubPr>
@@ -18871,7 +18812,7 @@
                         <m:sSubPr>
                           <m:ctrlPr>
                             <a:rPr lang="en-US" i="1">
-                              <a:latin typeface="Cambria Math"/>
+                              <a:latin typeface="Cambria Math" panose="02040503050406030204" pitchFamily="18" charset="0"/>
                             </a:rPr>
                           </m:ctrlPr>
                         </m:sSubPr>
@@ -18978,19 +18919,15 @@
           <a:lstStyle/>
           <a:p>
             <a:r>
-              <a:rPr lang="en-US" sz="600" i="1" dirty="0" err="1" smtClean="0"/>
+              <a:rPr lang="en-US" sz="600" i="1" dirty="0" err="1"/>
               <a:t>Shitzer</a:t>
             </a:r>
             <a:r>
               <a:rPr lang="en-US" sz="600" i="1" dirty="0"/>
-              <a:t> </a:t>
-            </a:r>
-            <a:r>
-              <a:rPr lang="en-US" sz="600" i="1" dirty="0" smtClean="0"/>
-              <a:t>&amp; </a:t>
-            </a:r>
-            <a:r>
-              <a:rPr lang="en-US" sz="600" i="1" dirty="0" err="1" smtClean="0"/>
+              <a:t> &amp; </a:t>
+            </a:r>
+            <a:r>
+              <a:rPr lang="en-US" sz="600" i="1" dirty="0" err="1"/>
               <a:t>Eberhart</a:t>
             </a:r>
             <a:endParaRPr lang="en-US" sz="600" i="1" dirty="0"/>
@@ -19115,7 +19052,7 @@
                         <m:sSubPr>
                           <m:ctrlPr>
                             <a:rPr lang="en-US" i="1">
-                              <a:latin typeface="Cambria Math"/>
+                              <a:latin typeface="Cambria Math" panose="02040503050406030204" pitchFamily="18" charset="0"/>
                             </a:rPr>
                           </m:ctrlPr>
                         </m:sSubPr>
@@ -19158,7 +19095,7 @@
                         <m:sSubPr>
                           <m:ctrlPr>
                             <a:rPr lang="en-US" i="1">
-                              <a:latin typeface="Cambria Math"/>
+                              <a:latin typeface="Cambria Math" panose="02040503050406030204" pitchFamily="18" charset="0"/>
                             </a:rPr>
                           </m:ctrlPr>
                         </m:sSubPr>
@@ -19183,7 +19120,7 @@
                         <m:sSubPr>
                           <m:ctrlPr>
                             <a:rPr lang="en-US" i="1">
-                              <a:latin typeface="Cambria Math"/>
+                              <a:latin typeface="Cambria Math" panose="02040503050406030204" pitchFamily="18" charset="0"/>
                             </a:rPr>
                           </m:ctrlPr>
                         </m:sSubPr>
@@ -19193,7 +19130,7 @@
                               <m:chr m:val="̇"/>
                               <m:ctrlPr>
                                 <a:rPr lang="en-US" i="1">
-                                  <a:latin typeface="Cambria Math"/>
+                                  <a:latin typeface="Cambria Math" panose="02040503050406030204" pitchFamily="18" charset="0"/>
                                 </a:rPr>
                               </m:ctrlPr>
                             </m:accPr>
@@ -19415,7 +19352,7 @@
                         <m:sSubPr>
                           <m:ctrlPr>
                             <a:rPr lang="en-US" i="1">
-                              <a:latin typeface="Cambria Math"/>
+                              <a:latin typeface="Cambria Math" panose="02040503050406030204" pitchFamily="18" charset="0"/>
                             </a:rPr>
                           </m:ctrlPr>
                         </m:sSubPr>
@@ -19522,19 +19459,15 @@
           <a:lstStyle/>
           <a:p>
             <a:r>
-              <a:rPr lang="en-US" sz="600" i="1" dirty="0" err="1" smtClean="0"/>
+              <a:rPr lang="en-US" sz="600" i="1" dirty="0" err="1"/>
               <a:t>Shitzer</a:t>
             </a:r>
             <a:r>
               <a:rPr lang="en-US" sz="600" i="1" dirty="0"/>
-              <a:t> </a:t>
-            </a:r>
-            <a:r>
-              <a:rPr lang="en-US" sz="600" i="1" dirty="0" smtClean="0"/>
-              <a:t>&amp; </a:t>
-            </a:r>
-            <a:r>
-              <a:rPr lang="en-US" sz="600" i="1" dirty="0" err="1" smtClean="0"/>
+              <a:t> &amp; </a:t>
+            </a:r>
+            <a:r>
+              <a:rPr lang="en-US" sz="600" i="1" dirty="0" err="1"/>
               <a:t>Eberhart</a:t>
             </a:r>
             <a:endParaRPr lang="en-US" sz="600" i="1" dirty="0"/>
@@ -19564,14 +19497,13 @@
           <a:lstStyle/>
           <a:p>
             <a:r>
-              <a:rPr lang="en-US" sz="600" i="1" dirty="0" err="1" smtClean="0"/>
+              <a:rPr lang="en-US" sz="600" i="1" dirty="0" err="1"/>
               <a:t>McCutchan</a:t>
             </a:r>
             <a:r>
-              <a:rPr lang="en-US" sz="600" i="1" dirty="0" smtClean="0"/>
+              <a:rPr lang="en-US" sz="600" i="1" dirty="0"/>
               <a:t> &amp; Taylor</a:t>
             </a:r>
-            <a:endParaRPr lang="en-US" sz="600" i="1" dirty="0"/>
           </a:p>
         </p:txBody>
       </p:sp>
@@ -19646,7 +19578,7 @@
           <a:lstStyle/>
           <a:p>
             <a:r>
-              <a:rPr lang="en-US" sz="1200" i="1" dirty="0" smtClean="0"/>
+              <a:rPr lang="en-US" sz="1200" i="1" dirty="0"/>
               <a:t>Same for air and submerged</a:t>
             </a:r>
           </a:p>
@@ -19656,7 +19588,7 @@
               <a:buChar char="•"/>
             </a:pPr>
             <a:r>
-              <a:rPr lang="en-US" sz="1200" i="1" dirty="0" smtClean="0"/>
+              <a:rPr lang="en-US" sz="1200" i="1" dirty="0"/>
               <a:t>Assumes head above water when breathing</a:t>
             </a:r>
           </a:p>
@@ -19666,10 +19598,9 @@
               <a:buChar char="•"/>
             </a:pPr>
             <a:r>
-              <a:rPr lang="en-US" sz="1200" i="1" dirty="0" smtClean="0"/>
+              <a:rPr lang="en-US" sz="1200" i="1" dirty="0"/>
               <a:t>Should work for RR=0</a:t>
             </a:r>
-            <a:endParaRPr lang="en-US" sz="1200" i="1" dirty="0"/>
           </a:p>
         </p:txBody>
       </p:sp>
@@ -19791,7 +19722,7 @@
                         <m:sSubPr>
                           <m:ctrlPr>
                             <a:rPr lang="en-US" i="1">
-                              <a:latin typeface="Cambria Math"/>
+                              <a:latin typeface="Cambria Math" panose="02040503050406030204" pitchFamily="18" charset="0"/>
                             </a:rPr>
                           </m:ctrlPr>
                         </m:sSubPr>
@@ -19996,7 +19927,7 @@
                         <m:fPr>
                           <m:ctrlPr>
                             <a:rPr lang="en-US" i="1">
-                              <a:latin typeface="Cambria Math"/>
+                              <a:latin typeface="Cambria Math" panose="02040503050406030204" pitchFamily="18" charset="0"/>
                             </a:rPr>
                           </m:ctrlPr>
                         </m:fPr>
@@ -20028,7 +19959,7 @@
                             <m:sSubPr>
                               <m:ctrlPr>
                                 <a:rPr lang="en-US" i="1">
-                                  <a:latin typeface="Cambria Math"/>
+                                  <a:latin typeface="Cambria Math" panose="02040503050406030204" pitchFamily="18" charset="0"/>
                                 </a:rPr>
                               </m:ctrlPr>
                             </m:sSubPr>
@@ -20055,7 +19986,7 @@
                         <m:sSupPr>
                           <m:ctrlPr>
                             <a:rPr lang="en-US" i="1">
-                              <a:latin typeface="Cambria Math"/>
+                              <a:latin typeface="Cambria Math" panose="02040503050406030204" pitchFamily="18" charset="0"/>
                             </a:rPr>
                           </m:ctrlPr>
                         </m:sSupPr>
@@ -20072,7 +20003,7 @@
                             <m:dPr>
                               <m:ctrlPr>
                                 <a:rPr lang="en-US" i="1">
-                                  <a:latin typeface="Cambria Math"/>
+                                  <a:latin typeface="Cambria Math" panose="02040503050406030204" pitchFamily="18" charset="0"/>
                                 </a:rPr>
                               </m:ctrlPr>
                             </m:dPr>
@@ -20081,7 +20012,7 @@
                                 <m:fPr>
                                   <m:ctrlPr>
                                     <a:rPr lang="en-US" i="1">
-                                      <a:latin typeface="Cambria Math"/>
+                                      <a:latin typeface="Cambria Math" panose="02040503050406030204" pitchFamily="18" charset="0"/>
                                     </a:rPr>
                                   </m:ctrlPr>
                                 </m:fPr>
@@ -20096,7 +20027,7 @@
                                     <m:dPr>
                                       <m:ctrlPr>
                                         <a:rPr lang="en-US" i="1">
-                                          <a:latin typeface="Cambria Math"/>
+                                          <a:latin typeface="Cambria Math" panose="02040503050406030204" pitchFamily="18" charset="0"/>
                                         </a:rPr>
                                       </m:ctrlPr>
                                     </m:dPr>
@@ -20105,7 +20036,7 @@
                                         <m:sSubPr>
                                           <m:ctrlPr>
                                             <a:rPr lang="en-US" i="1">
-                                              <a:latin typeface="Cambria Math"/>
+                                              <a:latin typeface="Cambria Math" panose="02040503050406030204" pitchFamily="18" charset="0"/>
                                             </a:rPr>
                                           </m:ctrlPr>
                                         </m:sSubPr>
@@ -20140,7 +20071,7 @@
                                     <m:sSubPr>
                                       <m:ctrlPr>
                                         <a:rPr lang="en-US" i="1">
-                                          <a:latin typeface="Cambria Math"/>
+                                          <a:latin typeface="Cambria Math" panose="02040503050406030204" pitchFamily="18" charset="0"/>
                                         </a:rPr>
                                       </m:ctrlPr>
                                     </m:sSubPr>
@@ -20252,16 +20183,7 @@
                 </a:solidFill>
                 <a:latin typeface="Calibri"/>
               </a:rPr>
-              <a:t>(°</a:t>
-            </a:r>
-            <a:r>
-              <a:rPr lang="en-US" sz="1200" i="1" dirty="0" smtClean="0">
-                <a:solidFill>
-                  <a:srgbClr val="000000"/>
-                </a:solidFill>
-                <a:latin typeface="Calibri"/>
-              </a:rPr>
-              <a:t>F)</a:t>
+              <a:t>(°F)</a:t>
             </a:r>
             <a:endParaRPr lang="en-US" sz="1200" i="1" dirty="0"/>
           </a:p>
@@ -20289,7 +20211,7 @@
           <a:lstStyle/>
           <a:p>
             <a:r>
-              <a:rPr lang="en-US" sz="1200" i="1" dirty="0" smtClean="0">
+              <a:rPr lang="en-US" sz="1200" i="1" dirty="0">
                 <a:solidFill>
                   <a:srgbClr val="000000"/>
                 </a:solidFill>
@@ -20576,25 +20498,23 @@
           <a:p>
             <a:pPr algn="ctr"/>
             <a:r>
-              <a:rPr lang="en-US" dirty="0" smtClean="0"/>
+              <a:rPr lang="en-US" dirty="0"/>
               <a:t>Heating (positive)</a:t>
             </a:r>
           </a:p>
           <a:p>
             <a:pPr algn="ctr"/>
             <a:r>
-              <a:rPr lang="en-US" dirty="0" smtClean="0"/>
+              <a:rPr lang="en-US" dirty="0"/>
               <a:t>and/or</a:t>
             </a:r>
-            <a:endParaRPr lang="en-US" dirty="0"/>
           </a:p>
           <a:p>
             <a:pPr algn="ctr"/>
             <a:r>
-              <a:rPr lang="en-US" dirty="0" smtClean="0"/>
+              <a:rPr lang="en-US" dirty="0"/>
               <a:t>Cooling (negative)</a:t>
             </a:r>
-            <a:endParaRPr lang="en-US" dirty="0"/>
           </a:p>
         </p:txBody>
       </p:sp>
@@ -20749,10 +20669,9 @@
           <a:p>
             <a:pPr algn="ctr"/>
             <a:r>
-              <a:rPr lang="en-US" dirty="0" smtClean="0"/>
+              <a:rPr lang="en-US" dirty="0"/>
               <a:t>Applied Temperature</a:t>
             </a:r>
-            <a:endParaRPr lang="en-US" dirty="0"/>
           </a:p>
         </p:txBody>
       </p:sp>
@@ -22514,7 +22433,7 @@
               <a:buNone/>
             </a:pPr>
             <a:r>
-              <a:rPr lang="en-US" dirty="0" smtClean="0"/>
+              <a:rPr lang="en-US" dirty="0"/>
               <a:t>\[\</a:t>
             </a:r>
             <a:r>
@@ -22709,7 +22628,7 @@
           <a:graphicData uri="http://schemas.openxmlformats.org/presentationml/2006/ole">
             <mc:AlternateContent xmlns:mc="http://schemas.openxmlformats.org/markup-compatibility/2006">
               <mc:Choice xmlns:v="urn:schemas-microsoft-com:vml" Requires="v">
-                <p:oleObj spid="_x0000_s3083" name="Equation" r:id="rId3" imgW="914400" imgH="198720" progId="Equation.DSMT4">
+                <p:oleObj spid="_x0000_s3085" name="Equation" r:id="rId3" imgW="914400" imgH="198720" progId="Equation.DSMT4">
                   <p:embed/>
                 </p:oleObj>
               </mc:Choice>
@@ -23754,14 +23673,14 @@
                 <a:gridCol w="587076">
                   <a:extLst>
                     <a:ext uri="{9D8B030D-6E8A-4147-A177-3AD203B41FA5}">
-                      <a16:colId xmlns:a16="http://schemas.microsoft.com/office/drawing/2014/main" xmlns="" val="20000"/>
+                      <a16:colId xmlns:a16="http://schemas.microsoft.com/office/drawing/2014/main" val="20000"/>
                     </a:ext>
                   </a:extLst>
                 </a:gridCol>
                 <a:gridCol w="3874488">
                   <a:extLst>
                     <a:ext uri="{9D8B030D-6E8A-4147-A177-3AD203B41FA5}">
-                      <a16:colId xmlns:a16="http://schemas.microsoft.com/office/drawing/2014/main" xmlns="" val="20001"/>
+                      <a16:colId xmlns:a16="http://schemas.microsoft.com/office/drawing/2014/main" val="20001"/>
                     </a:ext>
                   </a:extLst>
                 </a:gridCol>
@@ -23795,7 +23714,7 @@
                 </a:tc>
                 <a:extLst>
                   <a:ext uri="{0D108BD9-81ED-4DB2-BD59-A6C34878D82A}">
-                    <a16:rowId xmlns:a16="http://schemas.microsoft.com/office/drawing/2014/main" xmlns="" val="10000"/>
+                    <a16:rowId xmlns:a16="http://schemas.microsoft.com/office/drawing/2014/main" val="10000"/>
                   </a:ext>
                 </a:extLst>
               </a:tr>
@@ -23849,7 +23768,7 @@
                 </a:tc>
                 <a:extLst>
                   <a:ext uri="{0D108BD9-81ED-4DB2-BD59-A6C34878D82A}">
-                    <a16:rowId xmlns:a16="http://schemas.microsoft.com/office/drawing/2014/main" xmlns="" val="10001"/>
+                    <a16:rowId xmlns:a16="http://schemas.microsoft.com/office/drawing/2014/main" val="10001"/>
                   </a:ext>
                 </a:extLst>
               </a:tr>
@@ -23906,7 +23825,7 @@
                 </a:tc>
                 <a:extLst>
                   <a:ext uri="{0D108BD9-81ED-4DB2-BD59-A6C34878D82A}">
-                    <a16:rowId xmlns:a16="http://schemas.microsoft.com/office/drawing/2014/main" xmlns="" val="10002"/>
+                    <a16:rowId xmlns:a16="http://schemas.microsoft.com/office/drawing/2014/main" val="10002"/>
                   </a:ext>
                 </a:extLst>
               </a:tr>
@@ -23963,7 +23882,7 @@
                 </a:tc>
                 <a:extLst>
                   <a:ext uri="{0D108BD9-81ED-4DB2-BD59-A6C34878D82A}">
-                    <a16:rowId xmlns:a16="http://schemas.microsoft.com/office/drawing/2014/main" xmlns="" val="10003"/>
+                    <a16:rowId xmlns:a16="http://schemas.microsoft.com/office/drawing/2014/main" val="10003"/>
                   </a:ext>
                 </a:extLst>
               </a:tr>
@@ -24004,7 +23923,7 @@
                 </a:tc>
                 <a:extLst>
                   <a:ext uri="{0D108BD9-81ED-4DB2-BD59-A6C34878D82A}">
-                    <a16:rowId xmlns:a16="http://schemas.microsoft.com/office/drawing/2014/main" xmlns="" val="10004"/>
+                    <a16:rowId xmlns:a16="http://schemas.microsoft.com/office/drawing/2014/main" val="10004"/>
                   </a:ext>
                 </a:extLst>
               </a:tr>
@@ -24935,7 +24854,7 @@
           <a:p>
             <a:pPr algn="ctr"/>
             <a:r>
-              <a:rPr lang="en-US" sz="1200" smtClean="0">
+              <a:rPr lang="en-US" sz="1200">
                 <a:solidFill>
                   <a:schemeClr val="tx1"/>
                 </a:solidFill>
@@ -24946,7 +24865,7 @@
           <a:p>
             <a:pPr algn="ctr"/>
             <a:r>
-              <a:rPr lang="en-US" sz="1200" smtClean="0">
+              <a:rPr lang="en-US" sz="1200">
                 <a:solidFill>
                   <a:schemeClr val="tx1"/>
                 </a:solidFill>
@@ -25026,15 +24945,7 @@
                   <a:schemeClr val="tx1"/>
                 </a:solidFill>
               </a:rPr>
-              <a:t>Direct </a:t>
-            </a:r>
-            <a:r>
-              <a:rPr lang="en-US" sz="1200" smtClean="0">
-                <a:solidFill>
-                  <a:schemeClr val="tx1"/>
-                </a:solidFill>
-              </a:rPr>
-              <a:t>Effect</a:t>
+              <a:t>Direct Effect</a:t>
             </a:r>
             <a:endParaRPr lang="en-US" sz="1200" dirty="0">
               <a:solidFill>
@@ -25106,15 +25017,7 @@
                   <a:schemeClr val="tx1"/>
                 </a:solidFill>
               </a:rPr>
-              <a:t>Direct </a:t>
-            </a:r>
-            <a:r>
-              <a:rPr lang="en-US" sz="1200" smtClean="0">
-                <a:solidFill>
-                  <a:schemeClr val="tx1"/>
-                </a:solidFill>
-              </a:rPr>
-              <a:t>Effect</a:t>
+              <a:t>Direct Effect</a:t>
             </a:r>
             <a:endParaRPr lang="en-US" sz="1200" dirty="0">
               <a:solidFill>
@@ -26965,7 +26868,7 @@
           <a:p>
             <a:pPr algn="ctr"/>
             <a:r>
-              <a:rPr lang="en-US" smtClean="0"/>
+              <a:rPr lang="en-US"/>
               <a:t>Systemic PD </a:t>
             </a:r>
             <a:r>
@@ -33576,7 +33479,7 @@
           <a:p>
             <a:pPr algn="ctr"/>
             <a:r>
-              <a:rPr lang="en-US" sz="1000" smtClean="0"/>
+              <a:rPr lang="en-US" sz="1000"/>
               <a:t>Direct PD Effects</a:t>
             </a:r>
             <a:endParaRPr lang="en-US" sz="1000" dirty="0"/>
@@ -36021,18 +35924,13 @@
           <a:p>
             <a:pPr algn="ctr"/>
             <a:r>
-              <a:rPr lang="en-US" smtClean="0">
+              <a:rPr lang="en-US">
                 <a:solidFill>
                   <a:sysClr val="windowText" lastClr="000000"/>
                 </a:solidFill>
               </a:rPr>
               <a:t>To Stomach</a:t>
             </a:r>
-            <a:endParaRPr lang="en-US">
-              <a:solidFill>
-                <a:sysClr val="windowText" lastClr="000000"/>
-              </a:solidFill>
-            </a:endParaRPr>
           </a:p>
         </p:txBody>
       </p:sp>
@@ -36198,10 +36096,9 @@
           <a:lstStyle/>
           <a:p>
             <a:r>
-              <a:rPr lang="en-US" sz="800" dirty="0" smtClean="0"/>
+              <a:rPr lang="en-US" sz="800" dirty="0"/>
               <a:t>Verification Metabolic Rate Addition</a:t>
             </a:r>
-            <a:endParaRPr lang="en-US" sz="800" dirty="0"/>
           </a:p>
         </p:txBody>
       </p:sp>
@@ -36607,7 +36504,7 @@
           <a:p>
             <a:pPr algn="ctr"/>
             <a:r>
-              <a:rPr lang="en-US" dirty="0" smtClean="0">
+              <a:rPr lang="en-US" dirty="0">
                 <a:solidFill>
                   <a:schemeClr val="tx1"/>
                 </a:solidFill>
@@ -36616,13 +36513,6 @@
               </a:rPr>
               <a:t>Body</a:t>
             </a:r>
-            <a:endParaRPr lang="en-US" dirty="0">
-              <a:solidFill>
-                <a:schemeClr val="tx1"/>
-              </a:solidFill>
-              <a:latin typeface="Arial" pitchFamily="34" charset="0"/>
-              <a:cs typeface="Arial" pitchFamily="34" charset="0"/>
-            </a:endParaRPr>
           </a:p>
         </p:txBody>
       </p:sp>
@@ -36649,10 +36539,9 @@
           <a:lstStyle/>
           <a:p>
             <a:r>
-              <a:rPr lang="en-US" dirty="0" smtClean="0"/>
+              <a:rPr lang="en-US" dirty="0"/>
               <a:t>Sweat</a:t>
             </a:r>
-            <a:endParaRPr lang="en-US" dirty="0"/>
           </a:p>
         </p:txBody>
       </p:sp>
@@ -36679,10 +36568,9 @@
           <a:lstStyle/>
           <a:p>
             <a:r>
-              <a:rPr lang="en-US" i="1" dirty="0" smtClean="0"/>
+              <a:rPr lang="en-US" i="1" dirty="0"/>
               <a:t>Respiration</a:t>
             </a:r>
-            <a:endParaRPr lang="en-US" i="1" dirty="0"/>
           </a:p>
         </p:txBody>
       </p:sp>
@@ -36709,10 +36597,9 @@
           <a:lstStyle/>
           <a:p>
             <a:r>
-              <a:rPr lang="en-US" dirty="0" smtClean="0"/>
+              <a:rPr lang="en-US" dirty="0"/>
               <a:t>Clothing</a:t>
             </a:r>
-            <a:endParaRPr lang="en-US" dirty="0"/>
           </a:p>
         </p:txBody>
       </p:sp>
@@ -36740,10 +36627,9 @@
           <a:p>
             <a:pPr algn="ctr"/>
             <a:r>
-              <a:rPr lang="en-US" dirty="0" smtClean="0"/>
+              <a:rPr lang="en-US" dirty="0"/>
               <a:t>Surroundings</a:t>
             </a:r>
-            <a:endParaRPr lang="en-US" dirty="0"/>
           </a:p>
         </p:txBody>
       </p:sp>
@@ -36771,10 +36657,9 @@
           <a:p>
             <a:pPr algn="ctr"/>
             <a:r>
-              <a:rPr lang="en-US" dirty="0" smtClean="0"/>
+              <a:rPr lang="en-US" dirty="0"/>
               <a:t>Mean Radiant Surface</a:t>
             </a:r>
-            <a:endParaRPr lang="en-US" dirty="0"/>
           </a:p>
         </p:txBody>
       </p:sp>
@@ -37105,10 +36990,9 @@
           <a:lstStyle/>
           <a:p>
             <a:r>
-              <a:rPr lang="en-US" dirty="0" smtClean="0"/>
+              <a:rPr lang="en-US" dirty="0"/>
               <a:t>Skin</a:t>
             </a:r>
-            <a:endParaRPr lang="en-US" dirty="0"/>
           </a:p>
         </p:txBody>
       </p:sp>
@@ -37359,10 +37243,9 @@
           <a:lstStyle/>
           <a:p>
             <a:r>
-              <a:rPr lang="en-US" i="1" dirty="0" smtClean="0"/>
+              <a:rPr lang="en-US" i="1" dirty="0"/>
               <a:t>Radiation</a:t>
             </a:r>
-            <a:endParaRPr lang="en-US" i="1" dirty="0"/>
           </a:p>
         </p:txBody>
       </p:sp>
@@ -37389,10 +37272,9 @@
           <a:lstStyle/>
           <a:p>
             <a:r>
-              <a:rPr lang="en-US" i="1" dirty="0" smtClean="0"/>
+              <a:rPr lang="en-US" i="1" dirty="0"/>
               <a:t>Convection</a:t>
             </a:r>
-            <a:endParaRPr lang="en-US" i="1" dirty="0"/>
           </a:p>
         </p:txBody>
       </p:sp>
@@ -37419,10 +37301,9 @@
           <a:lstStyle/>
           <a:p>
             <a:r>
-              <a:rPr lang="en-US" i="1" dirty="0" smtClean="0"/>
+              <a:rPr lang="en-US" i="1" dirty="0"/>
               <a:t>Evaporation</a:t>
             </a:r>
-            <a:endParaRPr lang="en-US" i="1" dirty="0"/>
           </a:p>
         </p:txBody>
       </p:sp>
@@ -37631,7 +37512,7 @@
           <a:p>
             <a:pPr algn="ctr"/>
             <a:r>
-              <a:rPr lang="en-US" sz="1050" b="1" u="sng" dirty="0" smtClean="0">
+              <a:rPr lang="en-US" sz="1050" b="1" u="sng" dirty="0">
                 <a:solidFill>
                   <a:prstClr val="white"/>
                 </a:solidFill>
@@ -37645,10 +37526,10 @@
               <a:buChar char="•"/>
             </a:pPr>
             <a:r>
-              <a:rPr lang="en-US" sz="1050" dirty="0" err="1" smtClean="0"/>
+              <a:rPr lang="en-US" sz="1050" dirty="0" err="1"/>
               <a:t>ProcessActions</a:t>
             </a:r>
-            <a:endParaRPr lang="en-US" sz="1050" dirty="0" smtClean="0"/>
+            <a:endParaRPr lang="en-US" sz="1050" dirty="0"/>
           </a:p>
           <a:p>
             <a:pPr marL="119063" indent="-119063">
@@ -37656,10 +37537,10 @@
               <a:buChar char="•"/>
             </a:pPr>
             <a:r>
-              <a:rPr lang="en-US" sz="1050" dirty="0" err="1" smtClean="0"/>
+              <a:rPr lang="en-US" sz="1050" dirty="0" err="1"/>
               <a:t>CalculateSupplementalValues</a:t>
             </a:r>
-            <a:endParaRPr lang="en-US" sz="1050" dirty="0" smtClean="0"/>
+            <a:endParaRPr lang="en-US" sz="1050" dirty="0"/>
           </a:p>
           <a:p>
             <a:pPr marL="576263" lvl="1" indent="-119063">
@@ -37667,10 +37548,10 @@
               <a:buChar char="•"/>
             </a:pPr>
             <a:r>
-              <a:rPr lang="en-US" sz="1050" dirty="0" err="1" smtClean="0"/>
+              <a:rPr lang="en-US" sz="1050" dirty="0" err="1"/>
               <a:t>AntioneEquation</a:t>
             </a:r>
-            <a:endParaRPr lang="en-US" sz="1050" dirty="0" smtClean="0"/>
+            <a:endParaRPr lang="en-US" sz="1050" dirty="0"/>
           </a:p>
           <a:p>
             <a:pPr marL="119063" indent="-119063">
@@ -37681,7 +37562,7 @@
               <a:rPr lang="en-US" sz="1050" dirty="0" err="1"/>
               <a:t>CalculateRadiation</a:t>
             </a:r>
-            <a:endParaRPr lang="en-US" sz="1050" dirty="0" smtClean="0"/>
+            <a:endParaRPr lang="en-US" sz="1050" dirty="0"/>
           </a:p>
           <a:p>
             <a:pPr marL="119063" indent="-119063">
@@ -37689,10 +37570,10 @@
               <a:buChar char="•"/>
             </a:pPr>
             <a:r>
-              <a:rPr lang="en-US" sz="1050" dirty="0" err="1" smtClean="0"/>
+              <a:rPr lang="en-US" sz="1050" dirty="0" err="1"/>
               <a:t>CalculateConvection</a:t>
             </a:r>
-            <a:endParaRPr lang="en-US" sz="1050" dirty="0" smtClean="0"/>
+            <a:endParaRPr lang="en-US" sz="1050" dirty="0"/>
           </a:p>
           <a:p>
             <a:pPr marL="119063" indent="-119063">
@@ -37715,10 +37596,10 @@
               <a:buChar char="•"/>
             </a:pPr>
             <a:r>
-              <a:rPr lang="en-US" sz="1050" dirty="0" err="1" smtClean="0"/>
+              <a:rPr lang="en-US" sz="1050" dirty="0" err="1"/>
               <a:t>CalculateRespiration</a:t>
             </a:r>
-            <a:endParaRPr lang="en-US" sz="1050" dirty="0" smtClean="0">
+            <a:endParaRPr lang="en-US" sz="1050" dirty="0">
               <a:solidFill>
                 <a:prstClr val="white"/>
               </a:solidFill>
@@ -37763,7 +37644,7 @@
           <a:p>
             <a:pPr algn="ctr"/>
             <a:r>
-              <a:rPr lang="en-US" sz="1050" b="1" u="sng" dirty="0" smtClean="0">
+              <a:rPr lang="en-US" sz="1050" b="1" u="sng" dirty="0">
                 <a:solidFill>
                   <a:prstClr val="white"/>
                 </a:solidFill>
@@ -37777,7 +37658,7 @@
               <a:buChar char="•"/>
             </a:pPr>
             <a:r>
-              <a:rPr lang="en-US" sz="1050" i="1" dirty="0" smtClean="0"/>
+              <a:rPr lang="en-US" sz="1050" i="1" dirty="0"/>
               <a:t>Combined Circuit Solved by Energy</a:t>
             </a:r>
           </a:p>
@@ -37820,14 +37701,14 @@
           <a:p>
             <a:pPr algn="ctr"/>
             <a:r>
-              <a:rPr lang="en-US" sz="1050" b="1" u="sng" dirty="0" err="1" smtClean="0">
+              <a:rPr lang="en-US" sz="1050" b="1" u="sng" dirty="0" err="1">
                 <a:solidFill>
                   <a:prstClr val="white"/>
                 </a:solidFill>
               </a:rPr>
               <a:t>PostProcess</a:t>
             </a:r>
-            <a:endParaRPr lang="en-US" sz="1050" b="1" u="sng" dirty="0" smtClean="0">
+            <a:endParaRPr lang="en-US" sz="1050" b="1" u="sng" dirty="0">
               <a:solidFill>
                 <a:prstClr val="white"/>
               </a:solidFill>
@@ -37839,7 +37720,7 @@
               <a:buChar char="•"/>
             </a:pPr>
             <a:r>
-              <a:rPr lang="en-US" sz="1050" i="1" dirty="0" smtClean="0"/>
+              <a:rPr lang="en-US" sz="1050" i="1" dirty="0"/>
               <a:t>Combined Circuit Time Advanced by Energy</a:t>
             </a:r>
           </a:p>
@@ -37882,7 +37763,7 @@
           <a:p>
             <a:pPr algn="ctr"/>
             <a:r>
-              <a:rPr lang="en-US" sz="1050" b="1" u="sng" dirty="0" smtClean="0">
+              <a:rPr lang="en-US" sz="1050" b="1" u="sng" dirty="0">
                 <a:solidFill>
                   <a:prstClr val="white"/>
                 </a:solidFill>
@@ -37896,7 +37777,7 @@
               <a:buChar char="•"/>
             </a:pPr>
             <a:r>
-              <a:rPr lang="en-US" sz="1050" dirty="0" smtClean="0"/>
+              <a:rPr lang="en-US" sz="1050" dirty="0"/>
               <a:t>Resting:</a:t>
             </a:r>
           </a:p>
@@ -37906,7 +37787,7 @@
               <a:buChar char="•"/>
             </a:pPr>
             <a:r>
-              <a:rPr lang="en-US" sz="1050" i="1" dirty="0" smtClean="0"/>
+              <a:rPr lang="en-US" sz="1050" i="1" dirty="0"/>
               <a:t>Use Standard Environment</a:t>
             </a:r>
           </a:p>
@@ -37916,7 +37797,7 @@
               <a:buChar char="•"/>
             </a:pPr>
             <a:r>
-              <a:rPr lang="en-US" sz="1050" dirty="0" smtClean="0">
+              <a:rPr lang="en-US" sz="1050" dirty="0">
                 <a:solidFill>
                   <a:prstClr val="white"/>
                 </a:solidFill>
@@ -37930,7 +37811,7 @@
               <a:buChar char="•"/>
             </a:pPr>
             <a:r>
-              <a:rPr lang="en-US" sz="1050" dirty="0" err="1" smtClean="0"/>
+              <a:rPr lang="en-US" sz="1050" dirty="0" err="1"/>
               <a:t>InitialEnvironment</a:t>
             </a:r>
             <a:endParaRPr lang="en-US" sz="1050" dirty="0">
@@ -38089,13 +37970,6 @@
   <p:clrMapOvr>
     <a:masterClrMapping/>
   </p:clrMapOvr>
-  <p:timing>
-    <p:tnLst>
-      <p:par>
-        <p:cTn id="1" dur="indefinite" restart="never" nodeType="tmRoot"/>
-      </p:par>
-    </p:tnLst>
-  </p:timing>
 </p:sld>
 </file>
 
@@ -38202,62 +38076,38 @@
       </p:grpSpPr>
       <p:pic>
         <p:nvPicPr>
-          <p:cNvPr id="4099" name="Picture 3"/>
+          <p:cNvPr id="2" name="Picture 1">
+            <a:extLst>
+              <a:ext uri="{FF2B5EF4-FFF2-40B4-BE49-F238E27FC236}">
+                <a16:creationId xmlns:a16="http://schemas.microsoft.com/office/drawing/2014/main" id="{071974CE-ABE2-4607-AD16-3C5C82731C89}"/>
+              </a:ext>
+            </a:extLst>
+          </p:cNvPr>
           <p:cNvPicPr>
-            <a:picLocks noChangeAspect="1" noChangeArrowheads="1"/>
+            <a:picLocks noChangeAspect="1"/>
           </p:cNvPicPr>
           <p:nvPr/>
         </p:nvPicPr>
         <p:blipFill>
-          <a:blip r:embed="rId2">
-            <a:extLst>
-              <a:ext uri="{28A0092B-C50C-407E-A947-70E740481C1C}">
-                <a14:useLocalDpi xmlns:a14="http://schemas.microsoft.com/office/drawing/2010/main" val="0"/>
-              </a:ext>
-            </a:extLst>
-          </a:blip>
-          <a:srcRect/>
+          <a:blip r:embed="rId2"/>
           <a:stretch>
             <a:fillRect/>
           </a:stretch>
         </p:blipFill>
-        <p:spPr bwMode="auto">
-          <a:xfrm>
-            <a:off x="0" y="1704975"/>
-            <a:ext cx="16878300" cy="3448050"/>
+        <p:spPr>
+          <a:xfrm>
+            <a:off x="0" y="2494991"/>
+            <a:ext cx="16874571" cy="3447288"/>
           </a:xfrm>
           <a:prstGeom prst="rect">
             <a:avLst/>
           </a:prstGeom>
-          <a:noFill/>
-          <a:ln>
-            <a:noFill/>
-          </a:ln>
-          <a:extLst>
-            <a:ext uri="{909E8E84-426E-40DD-AFC4-6F175D3DCCD1}">
-              <a14:hiddenFill xmlns:a14="http://schemas.microsoft.com/office/drawing/2010/main">
-                <a:solidFill>
-                  <a:schemeClr val="accent1"/>
-                </a:solidFill>
-              </a14:hiddenFill>
-            </a:ext>
-            <a:ext uri="{91240B29-F687-4F45-9708-019B960494DF}">
-              <a14:hiddenLine xmlns:a14="http://schemas.microsoft.com/office/drawing/2010/main" w="9525">
-                <a:solidFill>
-                  <a:schemeClr val="tx1"/>
-                </a:solidFill>
-                <a:miter lim="800000"/>
-                <a:headEnd/>
-                <a:tailEnd/>
-              </a14:hiddenLine>
-            </a:ext>
-          </a:extLst>
         </p:spPr>
       </p:pic>
     </p:spTree>
     <p:extLst>
       <p:ext uri="{BB962C8B-B14F-4D97-AF65-F5344CB8AC3E}">
-        <p14:creationId xmlns:p14="http://schemas.microsoft.com/office/powerpoint/2010/main" val="3624292087"/>
+        <p14:creationId xmlns:p14="http://schemas.microsoft.com/office/powerpoint/2010/main" val="1503218803"/>
       </p:ext>
     </p:extLst>
   </p:cSld>
@@ -38415,10 +38265,9 @@
           <a:p>
             <a:pPr algn="ctr"/>
             <a:r>
-              <a:rPr lang="en-US" sz="800" b="1" dirty="0" smtClean="0"/>
+              <a:rPr lang="en-US" sz="800" b="1" dirty="0"/>
               <a:t>A</a:t>
             </a:r>
-            <a:endParaRPr lang="en-US" sz="800" b="1" dirty="0"/>
           </a:p>
         </p:txBody>
       </p:sp>
@@ -38498,10 +38347,9 @@
           <a:p>
             <a:pPr algn="ctr"/>
             <a:r>
-              <a:rPr lang="en-US" sz="800" b="1" dirty="0" smtClean="0"/>
+              <a:rPr lang="en-US" sz="800" b="1" dirty="0"/>
               <a:t>C</a:t>
             </a:r>
-            <a:endParaRPr lang="en-US" sz="800" b="1" dirty="0"/>
           </a:p>
         </p:txBody>
       </p:sp>
@@ -38540,10 +38388,9 @@
           <a:p>
             <a:pPr algn="ctr"/>
             <a:r>
-              <a:rPr lang="en-US" sz="800" b="1" dirty="0" smtClean="0"/>
+              <a:rPr lang="en-US" sz="800" b="1" dirty="0"/>
               <a:t>D</a:t>
             </a:r>
-            <a:endParaRPr lang="en-US" sz="800" b="1" dirty="0"/>
           </a:p>
         </p:txBody>
       </p:sp>

</xml_diff>

<commit_message>
Missed a header when updating an Environment table.
</commit_message>
<xml_diff>
--- a/docs/Figures/EnvironmentWorking.pptx
+++ b/docs/Figures/EnvironmentWorking.pptx
@@ -15,7 +15,7 @@
     <p:sldId id="331" r:id="rId6"/>
     <p:sldId id="349" r:id="rId7"/>
     <p:sldId id="335" r:id="rId8"/>
-    <p:sldId id="355" r:id="rId9"/>
+    <p:sldId id="356" r:id="rId9"/>
     <p:sldId id="336" r:id="rId10"/>
     <p:sldId id="337" r:id="rId11"/>
     <p:sldId id="338" r:id="rId12"/>
@@ -1510,7 +1510,7 @@
           <a:p>
             <a:fld id="{7B126BB8-5932-4ACC-8CD5-328D9DA138C9}" type="datetimeFigureOut">
               <a:rPr lang="en-US" smtClean="0"/>
-              <a:t>8/23/2017</a:t>
+              <a:t>8/24/2017</a:t>
             </a:fld>
             <a:endParaRPr lang="en-US"/>
           </a:p>
@@ -1956,7 +1956,7 @@
           <a:p>
             <a:fld id="{9E9AFD63-10BD-4598-9E1E-9FFECB76D2D7}" type="datetimeFigureOut">
               <a:rPr lang="en-US" smtClean="0"/>
-              <a:t>8/23/2017</a:t>
+              <a:t>8/24/2017</a:t>
             </a:fld>
             <a:endParaRPr lang="en-US"/>
           </a:p>
@@ -2124,7 +2124,7 @@
           <a:p>
             <a:fld id="{9E9AFD63-10BD-4598-9E1E-9FFECB76D2D7}" type="datetimeFigureOut">
               <a:rPr lang="en-US" smtClean="0"/>
-              <a:t>8/23/2017</a:t>
+              <a:t>8/24/2017</a:t>
             </a:fld>
             <a:endParaRPr lang="en-US"/>
           </a:p>
@@ -2302,7 +2302,7 @@
           <a:p>
             <a:fld id="{9E9AFD63-10BD-4598-9E1E-9FFECB76D2D7}" type="datetimeFigureOut">
               <a:rPr lang="en-US" smtClean="0"/>
-              <a:t>8/23/2017</a:t>
+              <a:t>8/24/2017</a:t>
             </a:fld>
             <a:endParaRPr lang="en-US"/>
           </a:p>
@@ -4057,7 +4057,7 @@
           <a:p>
             <a:fld id="{9E9AFD63-10BD-4598-9E1E-9FFECB76D2D7}" type="datetimeFigureOut">
               <a:rPr lang="en-US" smtClean="0"/>
-              <a:t>8/23/2017</a:t>
+              <a:t>8/24/2017</a:t>
             </a:fld>
             <a:endParaRPr lang="en-US"/>
           </a:p>
@@ -4501,7 +4501,7 @@
           <a:p>
             <a:fld id="{9E9AFD63-10BD-4598-9E1E-9FFECB76D2D7}" type="datetimeFigureOut">
               <a:rPr lang="en-US" smtClean="0"/>
-              <a:t>8/23/2017</a:t>
+              <a:t>8/24/2017</a:t>
             </a:fld>
             <a:endParaRPr lang="en-US"/>
           </a:p>
@@ -4786,7 +4786,7 @@
           <a:p>
             <a:fld id="{9E9AFD63-10BD-4598-9E1E-9FFECB76D2D7}" type="datetimeFigureOut">
               <a:rPr lang="en-US" smtClean="0"/>
-              <a:t>8/23/2017</a:t>
+              <a:t>8/24/2017</a:t>
             </a:fld>
             <a:endParaRPr lang="en-US"/>
           </a:p>
@@ -5205,7 +5205,7 @@
           <a:p>
             <a:fld id="{9E9AFD63-10BD-4598-9E1E-9FFECB76D2D7}" type="datetimeFigureOut">
               <a:rPr lang="en-US" smtClean="0"/>
-              <a:t>8/23/2017</a:t>
+              <a:t>8/24/2017</a:t>
             </a:fld>
             <a:endParaRPr lang="en-US"/>
           </a:p>
@@ -5322,7 +5322,7 @@
           <a:p>
             <a:fld id="{9E9AFD63-10BD-4598-9E1E-9FFECB76D2D7}" type="datetimeFigureOut">
               <a:rPr lang="en-US" smtClean="0"/>
-              <a:t>8/23/2017</a:t>
+              <a:t>8/24/2017</a:t>
             </a:fld>
             <a:endParaRPr lang="en-US"/>
           </a:p>
@@ -5417,7 +5417,7 @@
           <a:p>
             <a:fld id="{9E9AFD63-10BD-4598-9E1E-9FFECB76D2D7}" type="datetimeFigureOut">
               <a:rPr lang="en-US" smtClean="0"/>
-              <a:t>8/23/2017</a:t>
+              <a:t>8/24/2017</a:t>
             </a:fld>
             <a:endParaRPr lang="en-US"/>
           </a:p>
@@ -5692,7 +5692,7 @@
           <a:p>
             <a:fld id="{9E9AFD63-10BD-4598-9E1E-9FFECB76D2D7}" type="datetimeFigureOut">
               <a:rPr lang="en-US" smtClean="0"/>
-              <a:t>8/23/2017</a:t>
+              <a:t>8/24/2017</a:t>
             </a:fld>
             <a:endParaRPr lang="en-US"/>
           </a:p>
@@ -5944,7 +5944,7 @@
           <a:p>
             <a:fld id="{9E9AFD63-10BD-4598-9E1E-9FFECB76D2D7}" type="datetimeFigureOut">
               <a:rPr lang="en-US" smtClean="0"/>
-              <a:t>8/23/2017</a:t>
+              <a:t>8/24/2017</a:t>
             </a:fld>
             <a:endParaRPr lang="en-US"/>
           </a:p>
@@ -6155,7 +6155,7 @@
           <a:p>
             <a:fld id="{9E9AFD63-10BD-4598-9E1E-9FFECB76D2D7}" type="datetimeFigureOut">
               <a:rPr lang="en-US" smtClean="0"/>
-              <a:t>8/23/2017</a:t>
+              <a:t>8/24/2017</a:t>
             </a:fld>
             <a:endParaRPr lang="en-US"/>
           </a:p>
@@ -10582,7 +10582,7 @@
           <a:graphicData uri="http://schemas.openxmlformats.org/presentationml/2006/ole">
             <mc:AlternateContent xmlns:mc="http://schemas.openxmlformats.org/markup-compatibility/2006">
               <mc:Choice xmlns:v="urn:schemas-microsoft-com:vml" Requires="v">
-                <p:oleObj spid="_x0000_s2064" name="Equation" r:id="rId12" imgW="1206360" imgH="241200" progId="Equation.DSMT4">
+                <p:oleObj spid="_x0000_s2065" name="Equation" r:id="rId12" imgW="1206360" imgH="241200" progId="Equation.DSMT4">
                   <p:embed/>
                 </p:oleObj>
               </mc:Choice>
@@ -22628,7 +22628,7 @@
           <a:graphicData uri="http://schemas.openxmlformats.org/presentationml/2006/ole">
             <mc:AlternateContent xmlns:mc="http://schemas.openxmlformats.org/markup-compatibility/2006">
               <mc:Choice xmlns:v="urn:schemas-microsoft-com:vml" Requires="v">
-                <p:oleObj spid="_x0000_s3085" name="Equation" r:id="rId3" imgW="914400" imgH="198720" progId="Equation.DSMT4">
+                <p:oleObj spid="_x0000_s3086" name="Equation" r:id="rId3" imgW="914400" imgH="198720" progId="Equation.DSMT4">
                   <p:embed/>
                 </p:oleObj>
               </mc:Choice>
@@ -38079,7 +38079,7 @@
           <p:cNvPr id="2" name="Picture 1">
             <a:extLst>
               <a:ext uri="{FF2B5EF4-FFF2-40B4-BE49-F238E27FC236}">
-                <a16:creationId xmlns:a16="http://schemas.microsoft.com/office/drawing/2014/main" id="{071974CE-ABE2-4607-AD16-3C5C82731C89}"/>
+                <a16:creationId xmlns:a16="http://schemas.microsoft.com/office/drawing/2014/main" id="{39502044-AEE6-46E7-BC01-3CEC409A6662}"/>
               </a:ext>
             </a:extLst>
           </p:cNvPr>
@@ -38107,7 +38107,7 @@
     </p:spTree>
     <p:extLst>
       <p:ext uri="{BB962C8B-B14F-4D97-AF65-F5344CB8AC3E}">
-        <p14:creationId xmlns:p14="http://schemas.microsoft.com/office/powerpoint/2010/main" val="1503218803"/>
+        <p14:creationId xmlns:p14="http://schemas.microsoft.com/office/powerpoint/2010/main" val="3380860822"/>
       </p:ext>
     </p:extLst>
   </p:cSld>

</xml_diff>